<commit_message>
Update Presentation ASPNET MVC Core - Part III.pptx
</commit_message>
<xml_diff>
--- a/Presentation ASPNET MVC Core - Part III.pptx
+++ b/Presentation ASPNET MVC Core - Part III.pptx
@@ -5,10 +5,10 @@
     <p:sldMasterId id="2147483648" r:id="rId1"/>
   </p:sldMasterIdLst>
   <p:notesMasterIdLst>
-    <p:notesMasterId r:id="rId32"/>
+    <p:notesMasterId r:id="rId33"/>
   </p:notesMasterIdLst>
   <p:handoutMasterIdLst>
-    <p:handoutMasterId r:id="rId33"/>
+    <p:handoutMasterId r:id="rId34"/>
   </p:handoutMasterIdLst>
   <p:sldIdLst>
     <p:sldId id="493" r:id="rId2"/>
@@ -28,19 +28,20 @@
     <p:sldId id="814" r:id="rId16"/>
     <p:sldId id="815" r:id="rId17"/>
     <p:sldId id="816" r:id="rId18"/>
-    <p:sldId id="819" r:id="rId19"/>
-    <p:sldId id="817" r:id="rId20"/>
-    <p:sldId id="820" r:id="rId21"/>
+    <p:sldId id="829" r:id="rId19"/>
+    <p:sldId id="819" r:id="rId20"/>
+    <p:sldId id="817" r:id="rId21"/>
     <p:sldId id="821" r:id="rId22"/>
-    <p:sldId id="788" r:id="rId23"/>
-    <p:sldId id="822" r:id="rId24"/>
-    <p:sldId id="823" r:id="rId25"/>
-    <p:sldId id="824" r:id="rId26"/>
-    <p:sldId id="825" r:id="rId27"/>
-    <p:sldId id="818" r:id="rId28"/>
-    <p:sldId id="790" r:id="rId29"/>
-    <p:sldId id="729" r:id="rId30"/>
-    <p:sldId id="827" r:id="rId31"/>
+    <p:sldId id="820" r:id="rId23"/>
+    <p:sldId id="788" r:id="rId24"/>
+    <p:sldId id="822" r:id="rId25"/>
+    <p:sldId id="823" r:id="rId26"/>
+    <p:sldId id="824" r:id="rId27"/>
+    <p:sldId id="825" r:id="rId28"/>
+    <p:sldId id="818" r:id="rId29"/>
+    <p:sldId id="790" r:id="rId30"/>
+    <p:sldId id="729" r:id="rId31"/>
+    <p:sldId id="827" r:id="rId32"/>
   </p:sldIdLst>
   <p:sldSz cx="12192000" cy="6858000"/>
   <p:notesSz cx="9928225" cy="6797675"/>
@@ -165,10 +166,11 @@
             <p14:sldId id="814"/>
             <p14:sldId id="815"/>
             <p14:sldId id="816"/>
+            <p14:sldId id="829"/>
             <p14:sldId id="819"/>
             <p14:sldId id="817"/>
+            <p14:sldId id="821"/>
             <p14:sldId id="820"/>
-            <p14:sldId id="821"/>
             <p14:sldId id="788"/>
           </p14:sldIdLst>
         </p14:section>
@@ -297,7 +299,7 @@
           <a:p>
             <a:fld id="{CD54E0B9-A397-428E-BA01-CD7A34B572EB}" type="datetimeFigureOut">
               <a:rPr lang="en-US" smtClean="0"/>
-              <a:t>5/16/2019</a:t>
+              <a:t>5/25/2019</a:t>
             </a:fld>
             <a:endParaRPr lang="en-US"/>
           </a:p>
@@ -462,7 +464,7 @@
           <a:p>
             <a:fld id="{AA161301-18C9-4CA0-A0BF-791B6E0DDD4D}" type="datetimeFigureOut">
               <a:rPr lang="en-GB" smtClean="0"/>
-              <a:t>16/05/2019</a:t>
+              <a:t>25/05/2019</a:t>
             </a:fld>
             <a:endParaRPr lang="en-GB"/>
           </a:p>
@@ -882,7 +884,94 @@
           <a:p>
             <a:fld id="{0BF20BA8-12AF-476D-99B2-894C09A4EE62}" type="slidenum">
               <a:rPr lang="en-GB" smtClean="0"/>
-              <a:t>22</a:t>
+              <a:t>19</a:t>
+            </a:fld>
+            <a:endParaRPr lang="en-GB"/>
+          </a:p>
+        </p:txBody>
+      </p:sp>
+    </p:spTree>
+    <p:extLst>
+      <p:ext uri="{BB962C8B-B14F-4D97-AF65-F5344CB8AC3E}">
+        <p14:creationId xmlns:p14="http://schemas.microsoft.com/office/powerpoint/2010/main" val="1300193659"/>
+      </p:ext>
+    </p:extLst>
+  </p:cSld>
+  <p:clrMapOvr>
+    <a:masterClrMapping/>
+  </p:clrMapOvr>
+</p:notes>
+</file>
+
+<file path=ppt/notesSlides/notesSlide11.xml><?xml version="1.0" encoding="utf-8"?>
+<p:notes xmlns:a="http://schemas.openxmlformats.org/drawingml/2006/main" xmlns:r="http://schemas.openxmlformats.org/officeDocument/2006/relationships" xmlns:p="http://schemas.openxmlformats.org/presentationml/2006/main">
+  <p:cSld>
+    <p:spTree>
+      <p:nvGrpSpPr>
+        <p:cNvPr id="1" name=""/>
+        <p:cNvGrpSpPr/>
+        <p:nvPr/>
+      </p:nvGrpSpPr>
+      <p:grpSpPr>
+        <a:xfrm>
+          <a:off x="0" y="0"/>
+          <a:ext cx="0" cy="0"/>
+          <a:chOff x="0" y="0"/>
+          <a:chExt cx="0" cy="0"/>
+        </a:xfrm>
+      </p:grpSpPr>
+      <p:sp>
+        <p:nvSpPr>
+          <p:cNvPr id="2" name="Slide Image Placeholder 1"/>
+          <p:cNvSpPr>
+            <a:spLocks noGrp="1" noRot="1" noChangeAspect="1"/>
+          </p:cNvSpPr>
+          <p:nvPr>
+            <p:ph type="sldImg"/>
+          </p:nvPr>
+        </p:nvSpPr>
+        <p:spPr/>
+      </p:sp>
+      <p:sp>
+        <p:nvSpPr>
+          <p:cNvPr id="3" name="Notes Placeholder 2"/>
+          <p:cNvSpPr>
+            <a:spLocks noGrp="1"/>
+          </p:cNvSpPr>
+          <p:nvPr>
+            <p:ph type="body" idx="1"/>
+          </p:nvPr>
+        </p:nvSpPr>
+        <p:spPr/>
+        <p:txBody>
+          <a:bodyPr/>
+          <a:lstStyle/>
+          <a:p>
+            <a:r>
+              <a:rPr lang="en-US" dirty="0"/>
+              <a:t>https://docs.microsoft.com/en-us/aspnet/core/security/anti-request-forgery</a:t>
+            </a:r>
+          </a:p>
+        </p:txBody>
+      </p:sp>
+      <p:sp>
+        <p:nvSpPr>
+          <p:cNvPr id="4" name="Slide Number Placeholder 3"/>
+          <p:cNvSpPr>
+            <a:spLocks noGrp="1"/>
+          </p:cNvSpPr>
+          <p:nvPr>
+            <p:ph type="sldNum" sz="quarter" idx="10"/>
+          </p:nvPr>
+        </p:nvSpPr>
+        <p:spPr/>
+        <p:txBody>
+          <a:bodyPr/>
+          <a:lstStyle/>
+          <a:p>
+            <a:fld id="{0BF20BA8-12AF-476D-99B2-894C09A4EE62}" type="slidenum">
+              <a:rPr lang="en-GB" smtClean="0"/>
+              <a:t>23</a:t>
             </a:fld>
             <a:endParaRPr lang="en-GB"/>
           </a:p>
@@ -1587,7 +1676,7 @@
     </p:spTree>
     <p:extLst>
       <p:ext uri="{BB962C8B-B14F-4D97-AF65-F5344CB8AC3E}">
-        <p14:creationId xmlns:p14="http://schemas.microsoft.com/office/powerpoint/2010/main" val="1300193659"/>
+        <p14:creationId xmlns:p14="http://schemas.microsoft.com/office/powerpoint/2010/main" val="630818279"/>
       </p:ext>
     </p:extLst>
   </p:cSld>
@@ -13238,10 +13327,7 @@
               <a:buFont typeface="Wingdings" panose="05000000000000000000" pitchFamily="2" charset="2"/>
               <a:buChar char="§"/>
             </a:pPr>
-            <a:r>
-              <a:rPr lang="en-US" dirty="0"/>
-              <a:t>STP is a technique used when the user requests a page with form data. The server sends a token associated with the current user's identity to the client. </a:t>
-            </a:r>
+            <a:endParaRPr lang="en-US" dirty="0"/>
           </a:p>
           <a:p>
             <a:pPr marL="342900" indent="-342900" algn="just">
@@ -13250,8 +13336,32 @@
             </a:pPr>
             <a:r>
               <a:rPr lang="en-US" dirty="0"/>
+              <a:t>STP is a technique used when the user requests a page with form data. The server sends a token associated with the current user's identity to the client. </a:t>
+            </a:r>
+          </a:p>
+          <a:p>
+            <a:pPr marL="342900" indent="-342900" algn="just">
+              <a:buFont typeface="Wingdings" panose="05000000000000000000" pitchFamily="2" charset="2"/>
+              <a:buChar char="§"/>
+            </a:pPr>
+            <a:endParaRPr lang="en-US" dirty="0"/>
+          </a:p>
+          <a:p>
+            <a:pPr marL="342900" indent="-342900" algn="just">
+              <a:buFont typeface="Wingdings" panose="05000000000000000000" pitchFamily="2" charset="2"/>
+              <a:buChar char="§"/>
+            </a:pPr>
+            <a:r>
+              <a:rPr lang="en-US" dirty="0"/>
               <a:t>The client must send back the token to the server for verification. If the server receives a token that doesn't match the authenticated user's identity, the request should be rejected. </a:t>
             </a:r>
+          </a:p>
+          <a:p>
+            <a:pPr marL="342900" indent="-342900" algn="just">
+              <a:buFont typeface="Wingdings" panose="05000000000000000000" pitchFamily="2" charset="2"/>
+              <a:buChar char="§"/>
+            </a:pPr>
+            <a:endParaRPr lang="en-US" dirty="0"/>
           </a:p>
           <a:p>
             <a:pPr marL="342900" indent="-342900" algn="just">
@@ -13387,7 +13497,7 @@
             </a:r>
             <a:r>
               <a:rPr lang="en-US" b="1" dirty="0"/>
-              <a:t> Tokens by default on all forms it generates: </a:t>
+              <a:t> Tokens by default in all the forms: </a:t>
             </a:r>
           </a:p>
           <a:p>
@@ -13504,123 +13614,6 @@
                 <a:latin typeface="Consolas" panose="020B0609020204030204" pitchFamily="49" charset="0"/>
               </a:rPr>
               <a:t>&lt;form</a:t>
-            </a:r>
-            <a:r>
-              <a:rPr lang="en-US" dirty="0">
-                <a:solidFill>
-                  <a:srgbClr val="000000"/>
-                </a:solidFill>
-                <a:latin typeface="Consolas" panose="020B0609020204030204" pitchFamily="49" charset="0"/>
-              </a:rPr>
-              <a:t> </a:t>
-            </a:r>
-            <a:r>
-              <a:rPr lang="en-US" dirty="0">
-                <a:solidFill>
-                  <a:srgbClr val="FF0000"/>
-                </a:solidFill>
-                <a:highlight>
-                  <a:srgbClr val="FFFF00"/>
-                </a:highlight>
-                <a:latin typeface="Consolas" panose="020B0609020204030204" pitchFamily="49" charset="0"/>
-              </a:rPr>
-              <a:t>asp-controller</a:t>
-            </a:r>
-            <a:r>
-              <a:rPr lang="en-US" dirty="0">
-                <a:solidFill>
-                  <a:srgbClr val="000000"/>
-                </a:solidFill>
-                <a:highlight>
-                  <a:srgbClr val="FFFF00"/>
-                </a:highlight>
-                <a:latin typeface="Consolas" panose="020B0609020204030204" pitchFamily="49" charset="0"/>
-              </a:rPr>
-              <a:t>=</a:t>
-            </a:r>
-            <a:r>
-              <a:rPr lang="en-US" dirty="0">
-                <a:solidFill>
-                  <a:srgbClr val="0000FF"/>
-                </a:solidFill>
-                <a:highlight>
-                  <a:srgbClr val="FFFF00"/>
-                </a:highlight>
-                <a:latin typeface="Consolas" panose="020B0609020204030204" pitchFamily="49" charset="0"/>
-              </a:rPr>
-              <a:t>"Manage"</a:t>
-            </a:r>
-            <a:r>
-              <a:rPr lang="en-US" dirty="0">
-                <a:solidFill>
-                  <a:srgbClr val="000000"/>
-                </a:solidFill>
-                <a:highlight>
-                  <a:srgbClr val="FFFF00"/>
-                </a:highlight>
-                <a:latin typeface="Consolas" panose="020B0609020204030204" pitchFamily="49" charset="0"/>
-              </a:rPr>
-              <a:t> </a:t>
-            </a:r>
-            <a:r>
-              <a:rPr lang="en-US" dirty="0">
-                <a:solidFill>
-                  <a:srgbClr val="FF0000"/>
-                </a:solidFill>
-                <a:highlight>
-                  <a:srgbClr val="FFFF00"/>
-                </a:highlight>
-                <a:latin typeface="Consolas" panose="020B0609020204030204" pitchFamily="49" charset="0"/>
-              </a:rPr>
-              <a:t>asp-action</a:t>
-            </a:r>
-            <a:r>
-              <a:rPr lang="en-US" dirty="0">
-                <a:solidFill>
-                  <a:srgbClr val="000000"/>
-                </a:solidFill>
-                <a:highlight>
-                  <a:srgbClr val="FFFF00"/>
-                </a:highlight>
-                <a:latin typeface="Consolas" panose="020B0609020204030204" pitchFamily="49" charset="0"/>
-              </a:rPr>
-              <a:t>=</a:t>
-            </a:r>
-            <a:r>
-              <a:rPr lang="en-US" dirty="0">
-                <a:solidFill>
-                  <a:srgbClr val="0000FF"/>
-                </a:solidFill>
-                <a:highlight>
-                  <a:srgbClr val="FFFF00"/>
-                </a:highlight>
-                <a:latin typeface="Consolas" panose="020B0609020204030204" pitchFamily="49" charset="0"/>
-              </a:rPr>
-              <a:t>"</a:t>
-            </a:r>
-            <a:r>
-              <a:rPr lang="en-US" dirty="0" err="1">
-                <a:solidFill>
-                  <a:srgbClr val="0000FF"/>
-                </a:solidFill>
-                <a:highlight>
-                  <a:srgbClr val="FFFF00"/>
-                </a:highlight>
-                <a:latin typeface="Consolas" panose="020B0609020204030204" pitchFamily="49" charset="0"/>
-              </a:rPr>
-              <a:t>ChangePassword</a:t>
-            </a:r>
-            <a:r>
-              <a:rPr lang="en-US" dirty="0">
-                <a:solidFill>
-                  <a:srgbClr val="0000FF"/>
-                </a:solidFill>
-                <a:highlight>
-                  <a:srgbClr val="FFFF00"/>
-                </a:highlight>
-                <a:latin typeface="Consolas" panose="020B0609020204030204" pitchFamily="49" charset="0"/>
-              </a:rPr>
-              <a:t>"</a:t>
             </a:r>
             <a:r>
               <a:rPr lang="en-US" dirty="0">
@@ -13894,61 +13887,6 @@
             </a:pPr>
             <a:r>
               <a:rPr lang="en-US" dirty="0"/>
-              <a:t>You can also explicitly add an </a:t>
-            </a:r>
-            <a:r>
-              <a:rPr lang="en-US" dirty="0" err="1"/>
-              <a:t>antiforgery</a:t>
-            </a:r>
-            <a:r>
-              <a:rPr lang="en-US" dirty="0"/>
-              <a:t> token to a &lt;form&gt; element you create without using tag helpers or HTML helpers by using @</a:t>
-            </a:r>
-            <a:r>
-              <a:rPr lang="en-US" dirty="0" err="1"/>
-              <a:t>Html.AntiForgeryToken</a:t>
-            </a:r>
-            <a:r>
-              <a:rPr lang="en-US" dirty="0"/>
-              <a:t>():</a:t>
-            </a:r>
-            <a:endParaRPr lang="ro-RO" dirty="0"/>
-          </a:p>
-          <a:p>
-            <a:pPr marL="342900" indent="-342900" algn="just">
-              <a:buFont typeface="Wingdings" panose="05000000000000000000" pitchFamily="2" charset="2"/>
-              <a:buChar char="§"/>
-            </a:pPr>
-            <a:endParaRPr lang="en-US" b="1" dirty="0"/>
-          </a:p>
-          <a:p>
-            <a:pPr marL="342900" indent="-342900" algn="just">
-              <a:buFont typeface="Wingdings" panose="05000000000000000000" pitchFamily="2" charset="2"/>
-              <a:buChar char="§"/>
-            </a:pPr>
-            <a:endParaRPr lang="en-US" b="1" dirty="0"/>
-          </a:p>
-          <a:p>
-            <a:pPr marL="342900" indent="-342900" algn="just">
-              <a:buFont typeface="Wingdings" panose="05000000000000000000" pitchFamily="2" charset="2"/>
-              <a:buChar char="§"/>
-            </a:pPr>
-            <a:endParaRPr lang="en-US" b="1" dirty="0"/>
-          </a:p>
-          <a:p>
-            <a:pPr marL="342900" indent="-342900" algn="just">
-              <a:buFont typeface="Wingdings" panose="05000000000000000000" pitchFamily="2" charset="2"/>
-              <a:buChar char="§"/>
-            </a:pPr>
-            <a:endParaRPr lang="en-US" b="1" dirty="0"/>
-          </a:p>
-          <a:p>
-            <a:pPr marL="342900" indent="-342900" algn="just">
-              <a:buFont typeface="Wingdings" panose="05000000000000000000" pitchFamily="2" charset="2"/>
-              <a:buChar char="§"/>
-            </a:pPr>
-            <a:r>
-              <a:rPr lang="en-US" dirty="0"/>
               <a:t>In each of the above cases, ASP.NET Core will add a hidden form field like the following:</a:t>
             </a:r>
             <a:endParaRPr lang="ro-RO" dirty="0"/>
@@ -13985,182 +13923,6 @@
       </p:sp>
       <p:sp>
         <p:nvSpPr>
-          <p:cNvPr id="4" name="Rectangle 3">
-            <a:extLst>
-              <a:ext uri="{FF2B5EF4-FFF2-40B4-BE49-F238E27FC236}">
-                <a16:creationId xmlns:a16="http://schemas.microsoft.com/office/drawing/2014/main" id="{58F06749-D66E-4E20-A24A-8AF1A2B46634}"/>
-              </a:ext>
-            </a:extLst>
-          </p:cNvPr>
-          <p:cNvSpPr/>
-          <p:nvPr/>
-        </p:nvSpPr>
-        <p:spPr>
-          <a:xfrm>
-            <a:off x="1465276" y="2420888"/>
-            <a:ext cx="9433048" cy="923330"/>
-          </a:xfrm>
-          <a:prstGeom prst="rect">
-            <a:avLst/>
-          </a:prstGeom>
-          <a:solidFill>
-            <a:schemeClr val="bg1"/>
-          </a:solidFill>
-        </p:spPr>
-        <p:txBody>
-          <a:bodyPr wrap="square">
-            <a:spAutoFit/>
-          </a:bodyPr>
-          <a:lstStyle/>
-          <a:p>
-            <a:r>
-              <a:rPr lang="en-US" dirty="0">
-                <a:solidFill>
-                  <a:srgbClr val="800000"/>
-                </a:solidFill>
-                <a:latin typeface="Consolas" panose="020B0609020204030204" pitchFamily="49" charset="0"/>
-              </a:rPr>
-              <a:t>&lt;form</a:t>
-            </a:r>
-            <a:r>
-              <a:rPr lang="en-US" dirty="0">
-                <a:solidFill>
-                  <a:srgbClr val="000000"/>
-                </a:solidFill>
-                <a:latin typeface="Consolas" panose="020B0609020204030204" pitchFamily="49" charset="0"/>
-              </a:rPr>
-              <a:t> </a:t>
-            </a:r>
-            <a:r>
-              <a:rPr lang="en-US" dirty="0">
-                <a:solidFill>
-                  <a:srgbClr val="FF0000"/>
-                </a:solidFill>
-                <a:latin typeface="Consolas" panose="020B0609020204030204" pitchFamily="49" charset="0"/>
-              </a:rPr>
-              <a:t>action</a:t>
-            </a:r>
-            <a:r>
-              <a:rPr lang="en-US" dirty="0">
-                <a:solidFill>
-                  <a:srgbClr val="000000"/>
-                </a:solidFill>
-                <a:latin typeface="Consolas" panose="020B0609020204030204" pitchFamily="49" charset="0"/>
-              </a:rPr>
-              <a:t>=</a:t>
-            </a:r>
-            <a:r>
-              <a:rPr lang="en-US" dirty="0">
-                <a:solidFill>
-                  <a:srgbClr val="0000FF"/>
-                </a:solidFill>
-                <a:latin typeface="Consolas" panose="020B0609020204030204" pitchFamily="49" charset="0"/>
-              </a:rPr>
-              <a:t>"/"</a:t>
-            </a:r>
-            <a:r>
-              <a:rPr lang="en-US" dirty="0">
-                <a:solidFill>
-                  <a:srgbClr val="000000"/>
-                </a:solidFill>
-                <a:latin typeface="Consolas" panose="020B0609020204030204" pitchFamily="49" charset="0"/>
-              </a:rPr>
-              <a:t> </a:t>
-            </a:r>
-            <a:r>
-              <a:rPr lang="en-US" dirty="0">
-                <a:solidFill>
-                  <a:srgbClr val="FF0000"/>
-                </a:solidFill>
-                <a:latin typeface="Consolas" panose="020B0609020204030204" pitchFamily="49" charset="0"/>
-              </a:rPr>
-              <a:t>method</a:t>
-            </a:r>
-            <a:r>
-              <a:rPr lang="en-US" dirty="0">
-                <a:solidFill>
-                  <a:srgbClr val="000000"/>
-                </a:solidFill>
-                <a:latin typeface="Consolas" panose="020B0609020204030204" pitchFamily="49" charset="0"/>
-              </a:rPr>
-              <a:t>=</a:t>
-            </a:r>
-            <a:r>
-              <a:rPr lang="en-US" dirty="0">
-                <a:solidFill>
-                  <a:srgbClr val="0000FF"/>
-                </a:solidFill>
-                <a:latin typeface="Consolas" panose="020B0609020204030204" pitchFamily="49" charset="0"/>
-              </a:rPr>
-              <a:t>"post"</a:t>
-            </a:r>
-            <a:r>
-              <a:rPr lang="en-US" dirty="0">
-                <a:solidFill>
-                  <a:srgbClr val="800000"/>
-                </a:solidFill>
-                <a:latin typeface="Consolas" panose="020B0609020204030204" pitchFamily="49" charset="0"/>
-              </a:rPr>
-              <a:t>&gt;</a:t>
-            </a:r>
-            <a:endParaRPr lang="en-US" dirty="0">
-              <a:solidFill>
-                <a:srgbClr val="000000"/>
-              </a:solidFill>
-              <a:latin typeface="Consolas" panose="020B0609020204030204" pitchFamily="49" charset="0"/>
-            </a:endParaRPr>
-          </a:p>
-          <a:p>
-            <a:r>
-              <a:rPr lang="en-US" dirty="0">
-                <a:solidFill>
-                  <a:srgbClr val="000000"/>
-                </a:solidFill>
-                <a:latin typeface="Consolas" panose="020B0609020204030204" pitchFamily="49" charset="0"/>
-              </a:rPr>
-              <a:t>	@</a:t>
-            </a:r>
-            <a:r>
-              <a:rPr lang="en-US" dirty="0" err="1">
-                <a:solidFill>
-                  <a:srgbClr val="000000"/>
-                </a:solidFill>
-                <a:latin typeface="Consolas" panose="020B0609020204030204" pitchFamily="49" charset="0"/>
-              </a:rPr>
-              <a:t>Html.AntiForgeryToken</a:t>
-            </a:r>
-            <a:r>
-              <a:rPr lang="en-US" dirty="0">
-                <a:solidFill>
-                  <a:srgbClr val="000000"/>
-                </a:solidFill>
-                <a:latin typeface="Consolas" panose="020B0609020204030204" pitchFamily="49" charset="0"/>
-              </a:rPr>
-              <a:t>()</a:t>
-            </a:r>
-          </a:p>
-          <a:p>
-            <a:r>
-              <a:rPr lang="en-US" dirty="0">
-                <a:solidFill>
-                  <a:srgbClr val="800000"/>
-                </a:solidFill>
-                <a:latin typeface="Consolas" panose="020B0609020204030204" pitchFamily="49" charset="0"/>
-              </a:rPr>
-              <a:t>&lt;/form&gt;</a:t>
-            </a:r>
-            <a:endParaRPr lang="en-US" b="0" dirty="0">
-              <a:solidFill>
-                <a:srgbClr val="000000"/>
-              </a:solidFill>
-              <a:effectLst/>
-              <a:latin typeface="Consolas" panose="020B0609020204030204" pitchFamily="49" charset="0"/>
-            </a:endParaRPr>
-          </a:p>
-        </p:txBody>
-      </p:sp>
-      <p:sp>
-        <p:nvSpPr>
           <p:cNvPr id="6" name="Rectangle 5">
             <a:extLst>
               <a:ext uri="{FF2B5EF4-FFF2-40B4-BE49-F238E27FC236}">
@@ -14173,7 +13935,7 @@
         </p:nvSpPr>
         <p:spPr>
           <a:xfrm>
-            <a:off x="1415480" y="4759984"/>
+            <a:off x="1354578" y="2690336"/>
             <a:ext cx="9482844" cy="1477328"/>
           </a:xfrm>
           <a:prstGeom prst="rect">
@@ -14428,26 +14190,8 @@
               <a:buChar char="§"/>
             </a:pPr>
             <a:r>
-              <a:rPr lang="en-US" b="1" dirty="0"/>
-              <a:t>[</a:t>
-            </a:r>
-            <a:r>
-              <a:rPr lang="ro-RO" b="1" dirty="0" err="1"/>
-              <a:t>ValidateAntiForgeryToken</a:t>
-            </a:r>
-            <a:r>
-              <a:rPr lang="en-US" b="1" dirty="0"/>
-              <a:t>]</a:t>
-            </a:r>
-          </a:p>
-          <a:p>
-            <a:pPr marL="597150" lvl="1" indent="-342900" algn="just">
-              <a:buFont typeface="Wingdings" panose="05000000000000000000" pitchFamily="2" charset="2"/>
-              <a:buChar char="§"/>
-            </a:pPr>
-            <a:r>
               <a:rPr lang="en-US" dirty="0"/>
-              <a:t>action filter that can be applied to an individual action, a controller, or globally for the app. Requests made to actions that have this filter applied will be blocked unless the request includes a valid </a:t>
+              <a:t>Automatic generation of </a:t>
             </a:r>
             <a:r>
               <a:rPr lang="en-US" dirty="0" err="1"/>
@@ -14455,7 +14199,7 @@
             </a:r>
             <a:r>
               <a:rPr lang="en-US" dirty="0"/>
-              <a:t> token.</a:t>
+              <a:t> tokens for HTML form elements can be disabled:</a:t>
             </a:r>
             <a:endParaRPr lang="ro-RO" dirty="0"/>
           </a:p>
@@ -14494,7 +14238,7 @@
           <p:cNvPr id="7" name="Rectangle 6">
             <a:extLst>
               <a:ext uri="{FF2B5EF4-FFF2-40B4-BE49-F238E27FC236}">
-                <a16:creationId xmlns:a16="http://schemas.microsoft.com/office/drawing/2014/main" id="{8CBD59D1-7D33-4DD5-9E3D-761B09765068}"/>
+                <a16:creationId xmlns:a16="http://schemas.microsoft.com/office/drawing/2014/main" id="{7DF8455D-C452-47FE-9107-3491EA8CD188}"/>
               </a:ext>
             </a:extLst>
           </p:cNvPr>
@@ -14503,8 +14247,8 @@
         </p:nvSpPr>
         <p:spPr>
           <a:xfrm>
-            <a:off x="1775520" y="3424932"/>
-            <a:ext cx="9289032" cy="2308324"/>
+            <a:off x="2353544" y="2348880"/>
+            <a:ext cx="7656512" cy="923330"/>
           </a:xfrm>
           <a:prstGeom prst="rect">
             <a:avLst/>
@@ -14520,431 +14264,391 @@
           <a:lstStyle/>
           <a:p>
             <a:r>
-              <a:rPr lang="en-US" sz="1600" dirty="0">
+              <a:rPr lang="en-US" b="1" dirty="0">
+                <a:solidFill>
+                  <a:srgbClr val="000080"/>
+                </a:solidFill>
+                <a:highlight>
+                  <a:srgbClr val="FFFFFF"/>
+                </a:highlight>
+                <a:latin typeface="Courier New" panose="02070309020205020404" pitchFamily="49" charset="0"/>
+              </a:rPr>
+              <a:t>&lt;</a:t>
+            </a:r>
+            <a:r>
+              <a:rPr lang="en-US" dirty="0">
                 <a:solidFill>
                   <a:srgbClr val="000000"/>
                 </a:solidFill>
-                <a:latin typeface="Consolas" panose="020B0609020204030204" pitchFamily="49" charset="0"/>
-              </a:rPr>
-              <a:t>[</a:t>
-            </a:r>
-            <a:r>
-              <a:rPr lang="en-US" sz="1600" dirty="0">
-                <a:solidFill>
-                  <a:srgbClr val="267F99"/>
-                </a:solidFill>
-                <a:latin typeface="Consolas" panose="020B0609020204030204" pitchFamily="49" charset="0"/>
-              </a:rPr>
-              <a:t>Authorize</a:t>
-            </a:r>
-            <a:r>
-              <a:rPr lang="en-US" sz="1600" dirty="0">
+                <a:highlight>
+                  <a:srgbClr val="FFFFFF"/>
+                </a:highlight>
+                <a:latin typeface="Courier New" panose="02070309020205020404" pitchFamily="49" charset="0"/>
+              </a:rPr>
+              <a:t>form method</a:t>
+            </a:r>
+            <a:r>
+              <a:rPr lang="en-US" b="1" dirty="0">
+                <a:solidFill>
+                  <a:srgbClr val="000080"/>
+                </a:solidFill>
+                <a:highlight>
+                  <a:srgbClr val="FFFFFF"/>
+                </a:highlight>
+                <a:latin typeface="Courier New" panose="02070309020205020404" pitchFamily="49" charset="0"/>
+              </a:rPr>
+              <a:t>=</a:t>
+            </a:r>
+            <a:r>
+              <a:rPr lang="en-US" dirty="0">
+                <a:solidFill>
+                  <a:srgbClr val="808080"/>
+                </a:solidFill>
+                <a:highlight>
+                  <a:srgbClr val="FFFFFF"/>
+                </a:highlight>
+                <a:latin typeface="Courier New" panose="02070309020205020404" pitchFamily="49" charset="0"/>
+              </a:rPr>
+              <a:t>"post"</a:t>
+            </a:r>
+            <a:r>
+              <a:rPr lang="en-US" dirty="0">
                 <a:solidFill>
                   <a:srgbClr val="000000"/>
                 </a:solidFill>
-                <a:latin typeface="Consolas" panose="020B0609020204030204" pitchFamily="49" charset="0"/>
-              </a:rPr>
-              <a:t>]</a:t>
-            </a:r>
-          </a:p>
-          <a:p>
-            <a:r>
-              <a:rPr lang="en-US" sz="1600" dirty="0">
-                <a:solidFill>
-                  <a:srgbClr val="0000FF"/>
-                </a:solidFill>
-                <a:latin typeface="Consolas" panose="020B0609020204030204" pitchFamily="49" charset="0"/>
-              </a:rPr>
-              <a:t>public</a:t>
-            </a:r>
-            <a:r>
-              <a:rPr lang="en-US" sz="1600" dirty="0">
+                <a:highlight>
+                  <a:srgbClr val="FFFFFF"/>
+                </a:highlight>
+                <a:latin typeface="Courier New" panose="02070309020205020404" pitchFamily="49" charset="0"/>
+              </a:rPr>
+              <a:t> asp</a:t>
+            </a:r>
+            <a:r>
+              <a:rPr lang="en-US" b="1" dirty="0">
+                <a:solidFill>
+                  <a:srgbClr val="000080"/>
+                </a:solidFill>
+                <a:highlight>
+                  <a:srgbClr val="FFFFFF"/>
+                </a:highlight>
+                <a:latin typeface="Courier New" panose="02070309020205020404" pitchFamily="49" charset="0"/>
+              </a:rPr>
+              <a:t>-</a:t>
+            </a:r>
+            <a:r>
+              <a:rPr lang="en-US" dirty="0" err="1">
                 <a:solidFill>
                   <a:srgbClr val="000000"/>
                 </a:solidFill>
-                <a:latin typeface="Consolas" panose="020B0609020204030204" pitchFamily="49" charset="0"/>
-              </a:rPr>
-              <a:t> </a:t>
-            </a:r>
-            <a:r>
-              <a:rPr lang="en-US" sz="1600" dirty="0">
-                <a:solidFill>
-                  <a:srgbClr val="0000FF"/>
-                </a:solidFill>
-                <a:latin typeface="Consolas" panose="020B0609020204030204" pitchFamily="49" charset="0"/>
-              </a:rPr>
-              <a:t>class</a:t>
-            </a:r>
-            <a:r>
-              <a:rPr lang="en-US" sz="1600" dirty="0">
-                <a:solidFill>
-                  <a:srgbClr val="000000"/>
-                </a:solidFill>
-                <a:latin typeface="Consolas" panose="020B0609020204030204" pitchFamily="49" charset="0"/>
-              </a:rPr>
-              <a:t> </a:t>
-            </a:r>
-            <a:r>
-              <a:rPr lang="en-US" sz="1600" dirty="0" err="1">
-                <a:solidFill>
-                  <a:srgbClr val="267F99"/>
-                </a:solidFill>
-                <a:latin typeface="Consolas" panose="020B0609020204030204" pitchFamily="49" charset="0"/>
-              </a:rPr>
-              <a:t>AccountController</a:t>
-            </a:r>
-            <a:r>
-              <a:rPr lang="en-US" sz="1600" dirty="0">
-                <a:solidFill>
-                  <a:srgbClr val="000000"/>
-                </a:solidFill>
-                <a:latin typeface="Consolas" panose="020B0609020204030204" pitchFamily="49" charset="0"/>
-              </a:rPr>
-              <a:t> : </a:t>
-            </a:r>
-            <a:r>
-              <a:rPr lang="en-US" sz="1600" dirty="0">
-                <a:solidFill>
-                  <a:srgbClr val="267F99"/>
-                </a:solidFill>
-                <a:latin typeface="Consolas" panose="020B0609020204030204" pitchFamily="49" charset="0"/>
-              </a:rPr>
-              <a:t>Controller</a:t>
-            </a:r>
-            <a:r>
-              <a:rPr lang="en-US" sz="1600" dirty="0">
-                <a:solidFill>
-                  <a:srgbClr val="000000"/>
-                </a:solidFill>
-                <a:latin typeface="Consolas" panose="020B0609020204030204" pitchFamily="49" charset="0"/>
-              </a:rPr>
-              <a:t> {</a:t>
-            </a:r>
-          </a:p>
-          <a:p>
-            <a:r>
-              <a:rPr lang="en-US" sz="1600" dirty="0">
-                <a:solidFill>
-                  <a:srgbClr val="000000"/>
-                </a:solidFill>
-                <a:latin typeface="Consolas" panose="020B0609020204030204" pitchFamily="49" charset="0"/>
-              </a:rPr>
-              <a:t>    [</a:t>
-            </a:r>
-            <a:r>
-              <a:rPr lang="en-US" sz="1600" dirty="0" err="1">
-                <a:solidFill>
-                  <a:srgbClr val="267F99"/>
-                </a:solidFill>
-                <a:latin typeface="Consolas" panose="020B0609020204030204" pitchFamily="49" charset="0"/>
-              </a:rPr>
-              <a:t>HttpPost</a:t>
-            </a:r>
-            <a:r>
-              <a:rPr lang="en-US" sz="1600" dirty="0">
-                <a:solidFill>
-                  <a:srgbClr val="000000"/>
-                </a:solidFill>
-                <a:latin typeface="Consolas" panose="020B0609020204030204" pitchFamily="49" charset="0"/>
-              </a:rPr>
-              <a:t>]</a:t>
-            </a:r>
-          </a:p>
-          <a:p>
-            <a:r>
-              <a:rPr lang="en-US" sz="1600" dirty="0">
-                <a:solidFill>
-                  <a:srgbClr val="000000"/>
-                </a:solidFill>
-                <a:latin typeface="Consolas" panose="020B0609020204030204" pitchFamily="49" charset="0"/>
-              </a:rPr>
-              <a:t>    [</a:t>
-            </a:r>
-            <a:r>
-              <a:rPr lang="en-US" sz="1600" dirty="0" err="1">
-                <a:solidFill>
-                  <a:srgbClr val="267F99"/>
-                </a:solidFill>
-                <a:latin typeface="Consolas" panose="020B0609020204030204" pitchFamily="49" charset="0"/>
-              </a:rPr>
-              <a:t>AllowAnonymous</a:t>
-            </a:r>
-            <a:r>
-              <a:rPr lang="en-US" sz="1600" dirty="0">
-                <a:solidFill>
-                  <a:srgbClr val="000000"/>
-                </a:solidFill>
-                <a:latin typeface="Consolas" panose="020B0609020204030204" pitchFamily="49" charset="0"/>
-              </a:rPr>
-              <a:t>]</a:t>
-            </a:r>
-          </a:p>
-          <a:p>
-            <a:r>
-              <a:rPr lang="en-US" sz="1600" dirty="0">
-                <a:solidFill>
-                  <a:srgbClr val="000000"/>
-                </a:solidFill>
-                <a:latin typeface="Consolas" panose="020B0609020204030204" pitchFamily="49" charset="0"/>
-              </a:rPr>
-              <a:t>   </a:t>
-            </a:r>
-            <a:r>
-              <a:rPr lang="en-US" sz="1600" dirty="0">
-                <a:solidFill>
-                  <a:srgbClr val="000000"/>
-                </a:solidFill>
                 <a:highlight>
-                  <a:srgbClr val="FFFF00"/>
+                  <a:srgbClr val="FFFFFF"/>
                 </a:highlight>
-                <a:latin typeface="Consolas" panose="020B0609020204030204" pitchFamily="49" charset="0"/>
-              </a:rPr>
-              <a:t> [</a:t>
-            </a:r>
-            <a:r>
-              <a:rPr lang="en-US" sz="1600" dirty="0" err="1">
-                <a:solidFill>
-                  <a:srgbClr val="267F99"/>
+                <a:latin typeface="Courier New" panose="02070309020205020404" pitchFamily="49" charset="0"/>
+              </a:rPr>
+              <a:t>antiforgery</a:t>
+            </a:r>
+            <a:r>
+              <a:rPr lang="en-US" b="1" dirty="0">
+                <a:solidFill>
+                  <a:srgbClr val="000080"/>
                 </a:solidFill>
                 <a:highlight>
-                  <a:srgbClr val="FFFF00"/>
+                  <a:srgbClr val="FFFFFF"/>
                 </a:highlight>
-                <a:latin typeface="Consolas" panose="020B0609020204030204" pitchFamily="49" charset="0"/>
-              </a:rPr>
-              <a:t>ValidateAntiForgeryToken</a:t>
-            </a:r>
-            <a:r>
-              <a:rPr lang="en-US" sz="1600" dirty="0">
-                <a:solidFill>
-                  <a:srgbClr val="000000"/>
+                <a:latin typeface="Courier New" panose="02070309020205020404" pitchFamily="49" charset="0"/>
+              </a:rPr>
+              <a:t>=</a:t>
+            </a:r>
+            <a:r>
+              <a:rPr lang="en-US" dirty="0">
+                <a:solidFill>
+                  <a:srgbClr val="808080"/>
                 </a:solidFill>
                 <a:highlight>
-                  <a:srgbClr val="FFFF00"/>
+                  <a:srgbClr val="FFFFFF"/>
                 </a:highlight>
-                <a:latin typeface="Consolas" panose="020B0609020204030204" pitchFamily="49" charset="0"/>
-              </a:rPr>
-              <a:t>]</a:t>
-            </a:r>
-          </a:p>
-          <a:p>
-            <a:r>
-              <a:rPr lang="en-US" sz="1600" dirty="0">
-                <a:solidFill>
-                  <a:srgbClr val="000000"/>
-                </a:solidFill>
-                <a:latin typeface="Consolas" panose="020B0609020204030204" pitchFamily="49" charset="0"/>
-              </a:rPr>
-              <a:t>    </a:t>
-            </a:r>
-            <a:r>
-              <a:rPr lang="en-US" sz="1600" dirty="0">
-                <a:solidFill>
-                  <a:srgbClr val="0000FF"/>
-                </a:solidFill>
-                <a:latin typeface="Consolas" panose="020B0609020204030204" pitchFamily="49" charset="0"/>
-              </a:rPr>
-              <a:t>public</a:t>
-            </a:r>
-            <a:r>
-              <a:rPr lang="en-US" sz="1600" dirty="0">
-                <a:solidFill>
-                  <a:srgbClr val="000000"/>
-                </a:solidFill>
-                <a:latin typeface="Consolas" panose="020B0609020204030204" pitchFamily="49" charset="0"/>
-              </a:rPr>
-              <a:t> </a:t>
-            </a:r>
-            <a:r>
-              <a:rPr lang="en-US" sz="1600" dirty="0" err="1">
-                <a:solidFill>
-                  <a:srgbClr val="0000FF"/>
-                </a:solidFill>
-                <a:latin typeface="Consolas" panose="020B0609020204030204" pitchFamily="49" charset="0"/>
-              </a:rPr>
-              <a:t>async</a:t>
-            </a:r>
-            <a:r>
-              <a:rPr lang="en-US" sz="1600" dirty="0">
-                <a:solidFill>
-                  <a:srgbClr val="000000"/>
-                </a:solidFill>
-                <a:latin typeface="Consolas" panose="020B0609020204030204" pitchFamily="49" charset="0"/>
-              </a:rPr>
-              <a:t> </a:t>
-            </a:r>
-            <a:r>
-              <a:rPr lang="en-US" sz="1600" dirty="0">
-                <a:solidFill>
-                  <a:srgbClr val="267F99"/>
-                </a:solidFill>
-                <a:latin typeface="Consolas" panose="020B0609020204030204" pitchFamily="49" charset="0"/>
-              </a:rPr>
-              <a:t>Task</a:t>
-            </a:r>
-            <a:r>
-              <a:rPr lang="en-US" sz="1600" dirty="0">
-                <a:solidFill>
-                  <a:srgbClr val="000000"/>
-                </a:solidFill>
-                <a:latin typeface="Consolas" panose="020B0609020204030204" pitchFamily="49" charset="0"/>
-              </a:rPr>
-              <a:t>&lt;</a:t>
-            </a:r>
-            <a:r>
-              <a:rPr lang="en-US" sz="1600" dirty="0" err="1">
-                <a:solidFill>
-                  <a:srgbClr val="267F99"/>
-                </a:solidFill>
-                <a:latin typeface="Consolas" panose="020B0609020204030204" pitchFamily="49" charset="0"/>
-              </a:rPr>
-              <a:t>IActionResult</a:t>
-            </a:r>
-            <a:r>
-              <a:rPr lang="en-US" sz="1600" dirty="0">
-                <a:solidFill>
-                  <a:srgbClr val="000000"/>
-                </a:solidFill>
-                <a:latin typeface="Consolas" panose="020B0609020204030204" pitchFamily="49" charset="0"/>
-              </a:rPr>
-              <a:t>&gt; </a:t>
-            </a:r>
-            <a:r>
-              <a:rPr lang="en-US" sz="1600" dirty="0">
-                <a:solidFill>
-                  <a:srgbClr val="795E26"/>
-                </a:solidFill>
-                <a:latin typeface="Consolas" panose="020B0609020204030204" pitchFamily="49" charset="0"/>
-              </a:rPr>
-              <a:t>Login</a:t>
-            </a:r>
-            <a:r>
-              <a:rPr lang="en-US" sz="1600" dirty="0">
-                <a:solidFill>
-                  <a:srgbClr val="000000"/>
-                </a:solidFill>
-                <a:latin typeface="Consolas" panose="020B0609020204030204" pitchFamily="49" charset="0"/>
-              </a:rPr>
-              <a:t>(</a:t>
-            </a:r>
-            <a:r>
-              <a:rPr lang="en-US" sz="1600" dirty="0" err="1">
-                <a:solidFill>
-                  <a:srgbClr val="267F99"/>
-                </a:solidFill>
-                <a:latin typeface="Consolas" panose="020B0609020204030204" pitchFamily="49" charset="0"/>
-              </a:rPr>
-              <a:t>LoginModel</a:t>
-            </a:r>
-            <a:r>
-              <a:rPr lang="en-US" sz="1600" dirty="0">
-                <a:solidFill>
-                  <a:srgbClr val="000000"/>
-                </a:solidFill>
-                <a:latin typeface="Consolas" panose="020B0609020204030204" pitchFamily="49" charset="0"/>
-              </a:rPr>
-              <a:t> details) {</a:t>
-            </a:r>
-          </a:p>
-          <a:p>
-            <a:r>
-              <a:rPr lang="en-US" sz="1600" dirty="0">
-                <a:solidFill>
-                  <a:srgbClr val="000000"/>
-                </a:solidFill>
-                <a:latin typeface="Consolas" panose="020B0609020204030204" pitchFamily="49" charset="0"/>
-              </a:rPr>
-              <a:t>        </a:t>
-            </a:r>
-            <a:r>
-              <a:rPr lang="en-US" sz="1600" dirty="0">
-                <a:solidFill>
-                  <a:srgbClr val="AF00DB"/>
-                </a:solidFill>
-                <a:latin typeface="Consolas" panose="020B0609020204030204" pitchFamily="49" charset="0"/>
-              </a:rPr>
-              <a:t>return</a:t>
-            </a:r>
-            <a:r>
-              <a:rPr lang="en-US" sz="1600" dirty="0">
-                <a:solidFill>
-                  <a:srgbClr val="000000"/>
-                </a:solidFill>
-                <a:latin typeface="Consolas" panose="020B0609020204030204" pitchFamily="49" charset="0"/>
-              </a:rPr>
-              <a:t> </a:t>
-            </a:r>
-            <a:r>
-              <a:rPr lang="en-US" sz="1600" dirty="0">
-                <a:solidFill>
-                  <a:srgbClr val="795E26"/>
-                </a:solidFill>
-                <a:latin typeface="Consolas" panose="020B0609020204030204" pitchFamily="49" charset="0"/>
-              </a:rPr>
-              <a:t>View</a:t>
-            </a:r>
-            <a:r>
-              <a:rPr lang="en-US" sz="1600" dirty="0">
-                <a:solidFill>
-                  <a:srgbClr val="000000"/>
-                </a:solidFill>
-                <a:latin typeface="Consolas" panose="020B0609020204030204" pitchFamily="49" charset="0"/>
-              </a:rPr>
-              <a:t>(</a:t>
-            </a:r>
-            <a:r>
-              <a:rPr lang="en-US" sz="1600" dirty="0">
-                <a:solidFill>
-                  <a:srgbClr val="001080"/>
-                </a:solidFill>
-                <a:latin typeface="Consolas" panose="020B0609020204030204" pitchFamily="49" charset="0"/>
-              </a:rPr>
-              <a:t>details</a:t>
-            </a:r>
-            <a:r>
-              <a:rPr lang="en-US" sz="1600" dirty="0">
-                <a:solidFill>
-                  <a:srgbClr val="000000"/>
-                </a:solidFill>
-                <a:latin typeface="Consolas" panose="020B0609020204030204" pitchFamily="49" charset="0"/>
-              </a:rPr>
-              <a:t>);</a:t>
-            </a:r>
-          </a:p>
-          <a:p>
-            <a:r>
-              <a:rPr lang="en-US" sz="1600" dirty="0">
-                <a:solidFill>
-                  <a:srgbClr val="000000"/>
-                </a:solidFill>
-                <a:latin typeface="Consolas" panose="020B0609020204030204" pitchFamily="49" charset="0"/>
-              </a:rPr>
-              <a:t>    }</a:t>
-            </a:r>
-          </a:p>
-          <a:p>
-            <a:r>
-              <a:rPr lang="en-US" sz="1600" dirty="0">
-                <a:solidFill>
-                  <a:srgbClr val="000000"/>
-                </a:solidFill>
-                <a:latin typeface="Consolas" panose="020B0609020204030204" pitchFamily="49" charset="0"/>
-              </a:rPr>
-              <a:t>}</a:t>
-            </a:r>
-            <a:endParaRPr lang="en-US" sz="1600" b="0" dirty="0">
+                <a:latin typeface="Courier New" panose="02070309020205020404" pitchFamily="49" charset="0"/>
+              </a:rPr>
+              <a:t>"false"</a:t>
+            </a:r>
+            <a:r>
+              <a:rPr lang="en-US" b="1" dirty="0">
+                <a:solidFill>
+                  <a:srgbClr val="000080"/>
+                </a:solidFill>
+                <a:highlight>
+                  <a:srgbClr val="FFFFFF"/>
+                </a:highlight>
+                <a:latin typeface="Courier New" panose="02070309020205020404" pitchFamily="49" charset="0"/>
+              </a:rPr>
+              <a:t>&gt;</a:t>
+            </a:r>
+            <a:endParaRPr lang="en-US" dirty="0">
               <a:solidFill>
                 <a:srgbClr val="000000"/>
               </a:solidFill>
-              <a:effectLst/>
-              <a:latin typeface="Consolas" panose="020B0609020204030204" pitchFamily="49" charset="0"/>
+              <a:highlight>
+                <a:srgbClr val="FFFFFF"/>
+              </a:highlight>
+              <a:latin typeface="Courier New" panose="02070309020205020404" pitchFamily="49" charset="0"/>
             </a:endParaRPr>
+          </a:p>
+          <a:p>
+            <a:r>
+              <a:rPr lang="en-US" dirty="0">
+                <a:solidFill>
+                  <a:srgbClr val="000000"/>
+                </a:solidFill>
+                <a:highlight>
+                  <a:srgbClr val="FFFFFF"/>
+                </a:highlight>
+                <a:latin typeface="Courier New" panose="02070309020205020404" pitchFamily="49" charset="0"/>
+              </a:rPr>
+              <a:t>    </a:t>
+            </a:r>
+            <a:r>
+              <a:rPr lang="en-US" b="1" dirty="0">
+                <a:solidFill>
+                  <a:srgbClr val="000080"/>
+                </a:solidFill>
+                <a:highlight>
+                  <a:srgbClr val="FFFFFF"/>
+                </a:highlight>
+                <a:latin typeface="Courier New" panose="02070309020205020404" pitchFamily="49" charset="0"/>
+              </a:rPr>
+              <a:t>...</a:t>
+            </a:r>
+            <a:endParaRPr lang="en-US" dirty="0">
+              <a:solidFill>
+                <a:srgbClr val="000000"/>
+              </a:solidFill>
+              <a:highlight>
+                <a:srgbClr val="FFFFFF"/>
+              </a:highlight>
+              <a:latin typeface="Courier New" panose="02070309020205020404" pitchFamily="49" charset="0"/>
+            </a:endParaRPr>
+          </a:p>
+          <a:p>
+            <a:r>
+              <a:rPr lang="en-US" b="1" dirty="0">
+                <a:solidFill>
+                  <a:srgbClr val="000080"/>
+                </a:solidFill>
+                <a:highlight>
+                  <a:srgbClr val="FFFFFF"/>
+                </a:highlight>
+                <a:latin typeface="Courier New" panose="02070309020205020404" pitchFamily="49" charset="0"/>
+              </a:rPr>
+              <a:t>&lt;/</a:t>
+            </a:r>
+            <a:r>
+              <a:rPr lang="en-US" dirty="0">
+                <a:solidFill>
+                  <a:srgbClr val="000000"/>
+                </a:solidFill>
+                <a:highlight>
+                  <a:srgbClr val="FFFFFF"/>
+                </a:highlight>
+                <a:latin typeface="Courier New" panose="02070309020205020404" pitchFamily="49" charset="0"/>
+              </a:rPr>
+              <a:t>form</a:t>
+            </a:r>
+            <a:r>
+              <a:rPr lang="en-US" b="1" dirty="0">
+                <a:solidFill>
+                  <a:srgbClr val="000080"/>
+                </a:solidFill>
+                <a:highlight>
+                  <a:srgbClr val="FFFFFF"/>
+                </a:highlight>
+                <a:latin typeface="Courier New" panose="02070309020205020404" pitchFamily="49" charset="0"/>
+              </a:rPr>
+              <a:t>&gt;</a:t>
+            </a:r>
+            <a:endParaRPr lang="en-US" dirty="0"/>
+          </a:p>
+        </p:txBody>
+      </p:sp>
+      <p:sp>
+        <p:nvSpPr>
+          <p:cNvPr id="8" name="Rectangle 7">
+            <a:extLst>
+              <a:ext uri="{FF2B5EF4-FFF2-40B4-BE49-F238E27FC236}">
+                <a16:creationId xmlns:a16="http://schemas.microsoft.com/office/drawing/2014/main" id="{E8FCA60B-C639-4507-AFD5-6399F97D6F9C}"/>
+              </a:ext>
+            </a:extLst>
+          </p:cNvPr>
+          <p:cNvSpPr/>
+          <p:nvPr/>
+        </p:nvSpPr>
+        <p:spPr>
+          <a:xfrm>
+            <a:off x="2353544" y="3933056"/>
+            <a:ext cx="6096000" cy="923330"/>
+          </a:xfrm>
+          <a:prstGeom prst="rect">
+            <a:avLst/>
+          </a:prstGeom>
+          <a:solidFill>
+            <a:schemeClr val="bg1"/>
+          </a:solidFill>
+        </p:spPr>
+        <p:txBody>
+          <a:bodyPr>
+            <a:spAutoFit/>
+          </a:bodyPr>
+          <a:lstStyle/>
+          <a:p>
+            <a:r>
+              <a:rPr lang="en-US" b="1" dirty="0">
+                <a:solidFill>
+                  <a:srgbClr val="000080"/>
+                </a:solidFill>
+                <a:highlight>
+                  <a:srgbClr val="FFFFFF"/>
+                </a:highlight>
+                <a:latin typeface="Courier New" panose="02070309020205020404" pitchFamily="49" charset="0"/>
+              </a:rPr>
+              <a:t>&lt;!</a:t>
+            </a:r>
+            <a:r>
+              <a:rPr lang="en-US" dirty="0">
+                <a:solidFill>
+                  <a:srgbClr val="000000"/>
+                </a:solidFill>
+                <a:highlight>
+                  <a:srgbClr val="FFFFFF"/>
+                </a:highlight>
+                <a:latin typeface="Courier New" panose="02070309020205020404" pitchFamily="49" charset="0"/>
+              </a:rPr>
+              <a:t>form method</a:t>
+            </a:r>
+            <a:r>
+              <a:rPr lang="en-US" b="1" dirty="0">
+                <a:solidFill>
+                  <a:srgbClr val="000080"/>
+                </a:solidFill>
+                <a:highlight>
+                  <a:srgbClr val="FFFFFF"/>
+                </a:highlight>
+                <a:latin typeface="Courier New" panose="02070309020205020404" pitchFamily="49" charset="0"/>
+              </a:rPr>
+              <a:t>=</a:t>
+            </a:r>
+            <a:r>
+              <a:rPr lang="en-US" dirty="0">
+                <a:solidFill>
+                  <a:srgbClr val="808080"/>
+                </a:solidFill>
+                <a:highlight>
+                  <a:srgbClr val="FFFFFF"/>
+                </a:highlight>
+                <a:latin typeface="Courier New" panose="02070309020205020404" pitchFamily="49" charset="0"/>
+              </a:rPr>
+              <a:t>"post"</a:t>
+            </a:r>
+            <a:r>
+              <a:rPr lang="en-US" b="1" dirty="0">
+                <a:solidFill>
+                  <a:srgbClr val="000080"/>
+                </a:solidFill>
+                <a:highlight>
+                  <a:srgbClr val="FFFFFF"/>
+                </a:highlight>
+                <a:latin typeface="Courier New" panose="02070309020205020404" pitchFamily="49" charset="0"/>
+              </a:rPr>
+              <a:t>&gt;</a:t>
+            </a:r>
+            <a:endParaRPr lang="en-US" dirty="0">
+              <a:solidFill>
+                <a:srgbClr val="000000"/>
+              </a:solidFill>
+              <a:highlight>
+                <a:srgbClr val="FFFFFF"/>
+              </a:highlight>
+              <a:latin typeface="Courier New" panose="02070309020205020404" pitchFamily="49" charset="0"/>
+            </a:endParaRPr>
+          </a:p>
+          <a:p>
+            <a:r>
+              <a:rPr lang="en-US" dirty="0">
+                <a:solidFill>
+                  <a:srgbClr val="000000"/>
+                </a:solidFill>
+                <a:highlight>
+                  <a:srgbClr val="FFFFFF"/>
+                </a:highlight>
+                <a:latin typeface="Courier New" panose="02070309020205020404" pitchFamily="49" charset="0"/>
+              </a:rPr>
+              <a:t>    </a:t>
+            </a:r>
+            <a:r>
+              <a:rPr lang="en-US" b="1" dirty="0">
+                <a:solidFill>
+                  <a:srgbClr val="000080"/>
+                </a:solidFill>
+                <a:highlight>
+                  <a:srgbClr val="FFFFFF"/>
+                </a:highlight>
+                <a:latin typeface="Courier New" panose="02070309020205020404" pitchFamily="49" charset="0"/>
+              </a:rPr>
+              <a:t>...</a:t>
+            </a:r>
+            <a:endParaRPr lang="en-US" dirty="0">
+              <a:solidFill>
+                <a:srgbClr val="000000"/>
+              </a:solidFill>
+              <a:highlight>
+                <a:srgbClr val="FFFFFF"/>
+              </a:highlight>
+              <a:latin typeface="Courier New" panose="02070309020205020404" pitchFamily="49" charset="0"/>
+            </a:endParaRPr>
+          </a:p>
+          <a:p>
+            <a:r>
+              <a:rPr lang="en-US" b="1" dirty="0">
+                <a:solidFill>
+                  <a:srgbClr val="000080"/>
+                </a:solidFill>
+                <a:highlight>
+                  <a:srgbClr val="FFFFFF"/>
+                </a:highlight>
+                <a:latin typeface="Courier New" panose="02070309020205020404" pitchFamily="49" charset="0"/>
+              </a:rPr>
+              <a:t>&lt;/!</a:t>
+            </a:r>
+            <a:r>
+              <a:rPr lang="en-US" dirty="0">
+                <a:solidFill>
+                  <a:srgbClr val="000000"/>
+                </a:solidFill>
+                <a:highlight>
+                  <a:srgbClr val="FFFFFF"/>
+                </a:highlight>
+                <a:latin typeface="Courier New" panose="02070309020205020404" pitchFamily="49" charset="0"/>
+              </a:rPr>
+              <a:t>form</a:t>
+            </a:r>
+            <a:r>
+              <a:rPr lang="en-US" b="1" dirty="0">
+                <a:solidFill>
+                  <a:srgbClr val="000080"/>
+                </a:solidFill>
+                <a:highlight>
+                  <a:srgbClr val="FFFFFF"/>
+                </a:highlight>
+                <a:latin typeface="Courier New" panose="02070309020205020404" pitchFamily="49" charset="0"/>
+              </a:rPr>
+              <a:t>&gt;</a:t>
+            </a:r>
+            <a:endParaRPr lang="en-US" dirty="0"/>
           </a:p>
         </p:txBody>
       </p:sp>
     </p:spTree>
     <p:extLst>
       <p:ext uri="{BB962C8B-B14F-4D97-AF65-F5344CB8AC3E}">
-        <p14:creationId xmlns:p14="http://schemas.microsoft.com/office/powerpoint/2010/main" val="2739296328"/>
+        <p14:creationId xmlns:p14="http://schemas.microsoft.com/office/powerpoint/2010/main" val="3982896497"/>
       </p:ext>
     </p:extLst>
   </p:cSld>
@@ -14985,7 +14689,7 @@
       </p:grpSpPr>
       <p:sp>
         <p:nvSpPr>
-          <p:cNvPr id="3" name="Title 2"/>
+          <p:cNvPr id="2" name="Title 1"/>
           <p:cNvSpPr>
             <a:spLocks noGrp="1"/>
           </p:cNvSpPr>
@@ -15002,44 +14706,72 @@
               <a:rPr lang="en-US" dirty="0"/>
               <a:t>Cross-Site Request forgery</a:t>
             </a:r>
+            <a:endParaRPr lang="ro-RO" dirty="0"/>
           </a:p>
         </p:txBody>
       </p:sp>
-      <p:pic>
-        <p:nvPicPr>
-          <p:cNvPr id="9" name="Content Placeholder 8"/>
-          <p:cNvPicPr>
-            <a:picLocks noGrp="1" noChangeAspect="1"/>
-          </p:cNvPicPr>
+      <p:sp>
+        <p:nvSpPr>
+          <p:cNvPr id="3" name="Content Placeholder 2"/>
+          <p:cNvSpPr>
+            <a:spLocks noGrp="1"/>
+          </p:cNvSpPr>
           <p:nvPr>
             <p:ph idx="1"/>
           </p:nvPr>
-        </p:nvPicPr>
-        <p:blipFill>
-          <a:blip r:embed="rId2" cstate="print">
+        </p:nvSpPr>
+        <p:spPr/>
+        <p:txBody>
+          <a:bodyPr/>
+          <a:lstStyle/>
+          <a:p>
+            <a:pPr marL="342900" indent="-342900" algn="just">
+              <a:buFont typeface="Wingdings" panose="05000000000000000000" pitchFamily="2" charset="2"/>
+              <a:buChar char="§"/>
+            </a:pPr>
+            <a:r>
+              <a:rPr lang="en-US" b="1" dirty="0"/>
+              <a:t>[</a:t>
+            </a:r>
+            <a:r>
+              <a:rPr lang="ro-RO" b="1" dirty="0" err="1"/>
+              <a:t>ValidateAntiForgeryToken</a:t>
+            </a:r>
+            <a:r>
+              <a:rPr lang="en-US" b="1" dirty="0"/>
+              <a:t>]</a:t>
+            </a:r>
+          </a:p>
+          <a:p>
+            <a:pPr marL="597150" lvl="1" indent="-342900" algn="just">
+              <a:buFont typeface="Wingdings" panose="05000000000000000000" pitchFamily="2" charset="2"/>
+              <a:buChar char="§"/>
+            </a:pPr>
+            <a:r>
+              <a:rPr lang="en-US" dirty="0"/>
+              <a:t>action filter that can be applied to an individual action, a controller, or globally for the app. Requests made to actions that have this filter applied will be blocked unless the request includes a valid </a:t>
+            </a:r>
+            <a:r>
+              <a:rPr lang="en-US" dirty="0" err="1"/>
+              <a:t>antiforgery</a:t>
+            </a:r>
+            <a:r>
+              <a:rPr lang="en-US" dirty="0"/>
+              <a:t> token.</a:t>
+            </a:r>
+            <a:endParaRPr lang="ro-RO" dirty="0"/>
+          </a:p>
+        </p:txBody>
+      </p:sp>
+      <p:sp>
+        <p:nvSpPr>
+          <p:cNvPr id="5" name="Text Placeholder 4">
             <a:extLst>
-              <a:ext uri="{28A0092B-C50C-407E-A947-70E740481C1C}">
-                <a14:useLocalDpi xmlns:a14="http://schemas.microsoft.com/office/drawing/2010/main" val="0"/>
+              <a:ext uri="{FF2B5EF4-FFF2-40B4-BE49-F238E27FC236}">
+                <a16:creationId xmlns:a16="http://schemas.microsoft.com/office/drawing/2014/main" id="{52A29470-1D14-4DB4-B2EB-AC6AD725BE5C}"/>
               </a:ext>
             </a:extLst>
-          </a:blip>
-          <a:stretch>
-            <a:fillRect/>
-          </a:stretch>
-        </p:blipFill>
-        <p:spPr>
-          <a:xfrm>
-            <a:off x="4655840" y="2420888"/>
-            <a:ext cx="3177851" cy="3177851"/>
-          </a:xfrm>
-          <a:prstGeom prst="rect">
-            <a:avLst/>
-          </a:prstGeom>
-        </p:spPr>
-      </p:pic>
-      <p:sp>
-        <p:nvSpPr>
-          <p:cNvPr id="6" name="Text Placeholder 5"/>
+          </p:cNvPr>
           <p:cNvSpPr>
             <a:spLocks noGrp="1"/>
           </p:cNvSpPr>
@@ -15054,15 +14786,467 @@
           <a:p>
             <a:r>
               <a:rPr lang="en-US" dirty="0"/>
-              <a:t>Demo</a:t>
-            </a:r>
+              <a:t>How does ASP.NET Core MVC address CSRF?</a:t>
+            </a:r>
+          </a:p>
+        </p:txBody>
+      </p:sp>
+      <p:sp>
+        <p:nvSpPr>
+          <p:cNvPr id="7" name="Rectangle 6">
+            <a:extLst>
+              <a:ext uri="{FF2B5EF4-FFF2-40B4-BE49-F238E27FC236}">
+                <a16:creationId xmlns:a16="http://schemas.microsoft.com/office/drawing/2014/main" id="{8CBD59D1-7D33-4DD5-9E3D-761B09765068}"/>
+              </a:ext>
+            </a:extLst>
+          </p:cNvPr>
+          <p:cNvSpPr/>
+          <p:nvPr/>
+        </p:nvSpPr>
+        <p:spPr>
+          <a:xfrm>
+            <a:off x="1775520" y="3424932"/>
+            <a:ext cx="9289032" cy="2308324"/>
+          </a:xfrm>
+          <a:prstGeom prst="rect">
+            <a:avLst/>
+          </a:prstGeom>
+          <a:solidFill>
+            <a:schemeClr val="bg1"/>
+          </a:solidFill>
+        </p:spPr>
+        <p:txBody>
+          <a:bodyPr wrap="square">
+            <a:spAutoFit/>
+          </a:bodyPr>
+          <a:lstStyle/>
+          <a:p>
+            <a:r>
+              <a:rPr lang="en-US" sz="1600" dirty="0">
+                <a:solidFill>
+                  <a:srgbClr val="000000"/>
+                </a:solidFill>
+                <a:latin typeface="Consolas" panose="020B0609020204030204" pitchFamily="49" charset="0"/>
+              </a:rPr>
+              <a:t>[</a:t>
+            </a:r>
+            <a:r>
+              <a:rPr lang="en-US" sz="1600" dirty="0">
+                <a:solidFill>
+                  <a:srgbClr val="267F99"/>
+                </a:solidFill>
+                <a:latin typeface="Consolas" panose="020B0609020204030204" pitchFamily="49" charset="0"/>
+              </a:rPr>
+              <a:t>Authorize</a:t>
+            </a:r>
+            <a:r>
+              <a:rPr lang="en-US" sz="1600" dirty="0">
+                <a:solidFill>
+                  <a:srgbClr val="000000"/>
+                </a:solidFill>
+                <a:latin typeface="Consolas" panose="020B0609020204030204" pitchFamily="49" charset="0"/>
+              </a:rPr>
+              <a:t>]</a:t>
+            </a:r>
+          </a:p>
+          <a:p>
+            <a:r>
+              <a:rPr lang="en-US" sz="1600" dirty="0">
+                <a:solidFill>
+                  <a:srgbClr val="0000FF"/>
+                </a:solidFill>
+                <a:latin typeface="Consolas" panose="020B0609020204030204" pitchFamily="49" charset="0"/>
+              </a:rPr>
+              <a:t>public</a:t>
+            </a:r>
+            <a:r>
+              <a:rPr lang="en-US" sz="1600" dirty="0">
+                <a:solidFill>
+                  <a:srgbClr val="000000"/>
+                </a:solidFill>
+                <a:latin typeface="Consolas" panose="020B0609020204030204" pitchFamily="49" charset="0"/>
+              </a:rPr>
+              <a:t> </a:t>
+            </a:r>
+            <a:r>
+              <a:rPr lang="en-US" sz="1600" dirty="0">
+                <a:solidFill>
+                  <a:srgbClr val="0000FF"/>
+                </a:solidFill>
+                <a:latin typeface="Consolas" panose="020B0609020204030204" pitchFamily="49" charset="0"/>
+              </a:rPr>
+              <a:t>class</a:t>
+            </a:r>
+            <a:r>
+              <a:rPr lang="en-US" sz="1600" dirty="0">
+                <a:solidFill>
+                  <a:srgbClr val="000000"/>
+                </a:solidFill>
+                <a:latin typeface="Consolas" panose="020B0609020204030204" pitchFamily="49" charset="0"/>
+              </a:rPr>
+              <a:t> </a:t>
+            </a:r>
+            <a:r>
+              <a:rPr lang="en-US" sz="1600" dirty="0" err="1">
+                <a:solidFill>
+                  <a:srgbClr val="267F99"/>
+                </a:solidFill>
+                <a:latin typeface="Consolas" panose="020B0609020204030204" pitchFamily="49" charset="0"/>
+              </a:rPr>
+              <a:t>AccountController</a:t>
+            </a:r>
+            <a:r>
+              <a:rPr lang="en-US" sz="1600" dirty="0">
+                <a:solidFill>
+                  <a:srgbClr val="000000"/>
+                </a:solidFill>
+                <a:latin typeface="Consolas" panose="020B0609020204030204" pitchFamily="49" charset="0"/>
+              </a:rPr>
+              <a:t> : </a:t>
+            </a:r>
+            <a:r>
+              <a:rPr lang="en-US" sz="1600" dirty="0">
+                <a:solidFill>
+                  <a:srgbClr val="267F99"/>
+                </a:solidFill>
+                <a:latin typeface="Consolas" panose="020B0609020204030204" pitchFamily="49" charset="0"/>
+              </a:rPr>
+              <a:t>Controller</a:t>
+            </a:r>
+            <a:r>
+              <a:rPr lang="en-US" sz="1600" dirty="0">
+                <a:solidFill>
+                  <a:srgbClr val="000000"/>
+                </a:solidFill>
+                <a:latin typeface="Consolas" panose="020B0609020204030204" pitchFamily="49" charset="0"/>
+              </a:rPr>
+              <a:t> {</a:t>
+            </a:r>
+          </a:p>
+          <a:p>
+            <a:r>
+              <a:rPr lang="en-US" sz="1600" dirty="0">
+                <a:solidFill>
+                  <a:srgbClr val="000000"/>
+                </a:solidFill>
+                <a:latin typeface="Consolas" panose="020B0609020204030204" pitchFamily="49" charset="0"/>
+              </a:rPr>
+              <a:t>    [</a:t>
+            </a:r>
+            <a:r>
+              <a:rPr lang="en-US" sz="1600" dirty="0" err="1">
+                <a:solidFill>
+                  <a:srgbClr val="267F99"/>
+                </a:solidFill>
+                <a:latin typeface="Consolas" panose="020B0609020204030204" pitchFamily="49" charset="0"/>
+              </a:rPr>
+              <a:t>HttpPost</a:t>
+            </a:r>
+            <a:r>
+              <a:rPr lang="en-US" sz="1600" dirty="0">
+                <a:solidFill>
+                  <a:srgbClr val="000000"/>
+                </a:solidFill>
+                <a:latin typeface="Consolas" panose="020B0609020204030204" pitchFamily="49" charset="0"/>
+              </a:rPr>
+              <a:t>]</a:t>
+            </a:r>
+          </a:p>
+          <a:p>
+            <a:r>
+              <a:rPr lang="en-US" sz="1600" dirty="0">
+                <a:solidFill>
+                  <a:srgbClr val="000000"/>
+                </a:solidFill>
+                <a:latin typeface="Consolas" panose="020B0609020204030204" pitchFamily="49" charset="0"/>
+              </a:rPr>
+              <a:t>    [</a:t>
+            </a:r>
+            <a:r>
+              <a:rPr lang="en-US" sz="1600" dirty="0" err="1">
+                <a:solidFill>
+                  <a:srgbClr val="267F99"/>
+                </a:solidFill>
+                <a:latin typeface="Consolas" panose="020B0609020204030204" pitchFamily="49" charset="0"/>
+              </a:rPr>
+              <a:t>AllowAnonymous</a:t>
+            </a:r>
+            <a:r>
+              <a:rPr lang="en-US" sz="1600" dirty="0">
+                <a:solidFill>
+                  <a:srgbClr val="000000"/>
+                </a:solidFill>
+                <a:latin typeface="Consolas" panose="020B0609020204030204" pitchFamily="49" charset="0"/>
+              </a:rPr>
+              <a:t>]</a:t>
+            </a:r>
+          </a:p>
+          <a:p>
+            <a:r>
+              <a:rPr lang="en-US" sz="1600" dirty="0">
+                <a:solidFill>
+                  <a:srgbClr val="000000"/>
+                </a:solidFill>
+                <a:latin typeface="Consolas" panose="020B0609020204030204" pitchFamily="49" charset="0"/>
+              </a:rPr>
+              <a:t>   </a:t>
+            </a:r>
+            <a:r>
+              <a:rPr lang="en-US" sz="1600" dirty="0">
+                <a:solidFill>
+                  <a:srgbClr val="000000"/>
+                </a:solidFill>
+                <a:highlight>
+                  <a:srgbClr val="FFFF00"/>
+                </a:highlight>
+                <a:latin typeface="Consolas" panose="020B0609020204030204" pitchFamily="49" charset="0"/>
+              </a:rPr>
+              <a:t> [</a:t>
+            </a:r>
+            <a:r>
+              <a:rPr lang="en-US" sz="1600" dirty="0" err="1">
+                <a:solidFill>
+                  <a:srgbClr val="267F99"/>
+                </a:solidFill>
+                <a:highlight>
+                  <a:srgbClr val="FFFF00"/>
+                </a:highlight>
+                <a:latin typeface="Consolas" panose="020B0609020204030204" pitchFamily="49" charset="0"/>
+              </a:rPr>
+              <a:t>ValidateAntiForgeryToken</a:t>
+            </a:r>
+            <a:r>
+              <a:rPr lang="en-US" sz="1600" dirty="0">
+                <a:solidFill>
+                  <a:srgbClr val="000000"/>
+                </a:solidFill>
+                <a:highlight>
+                  <a:srgbClr val="FFFF00"/>
+                </a:highlight>
+                <a:latin typeface="Consolas" panose="020B0609020204030204" pitchFamily="49" charset="0"/>
+              </a:rPr>
+              <a:t>]</a:t>
+            </a:r>
+          </a:p>
+          <a:p>
+            <a:r>
+              <a:rPr lang="en-US" sz="1600" dirty="0">
+                <a:solidFill>
+                  <a:srgbClr val="000000"/>
+                </a:solidFill>
+                <a:latin typeface="Consolas" panose="020B0609020204030204" pitchFamily="49" charset="0"/>
+              </a:rPr>
+              <a:t>    </a:t>
+            </a:r>
+            <a:r>
+              <a:rPr lang="en-US" sz="1600" dirty="0">
+                <a:solidFill>
+                  <a:srgbClr val="0000FF"/>
+                </a:solidFill>
+                <a:latin typeface="Consolas" panose="020B0609020204030204" pitchFamily="49" charset="0"/>
+              </a:rPr>
+              <a:t>public</a:t>
+            </a:r>
+            <a:r>
+              <a:rPr lang="en-US" sz="1600" dirty="0">
+                <a:solidFill>
+                  <a:srgbClr val="000000"/>
+                </a:solidFill>
+                <a:latin typeface="Consolas" panose="020B0609020204030204" pitchFamily="49" charset="0"/>
+              </a:rPr>
+              <a:t> </a:t>
+            </a:r>
+            <a:r>
+              <a:rPr lang="en-US" sz="1600" dirty="0" err="1">
+                <a:solidFill>
+                  <a:srgbClr val="0000FF"/>
+                </a:solidFill>
+                <a:latin typeface="Consolas" panose="020B0609020204030204" pitchFamily="49" charset="0"/>
+              </a:rPr>
+              <a:t>async</a:t>
+            </a:r>
+            <a:r>
+              <a:rPr lang="en-US" sz="1600" dirty="0">
+                <a:solidFill>
+                  <a:srgbClr val="000000"/>
+                </a:solidFill>
+                <a:latin typeface="Consolas" panose="020B0609020204030204" pitchFamily="49" charset="0"/>
+              </a:rPr>
+              <a:t> </a:t>
+            </a:r>
+            <a:r>
+              <a:rPr lang="en-US" sz="1600" dirty="0">
+                <a:solidFill>
+                  <a:srgbClr val="267F99"/>
+                </a:solidFill>
+                <a:latin typeface="Consolas" panose="020B0609020204030204" pitchFamily="49" charset="0"/>
+              </a:rPr>
+              <a:t>Task</a:t>
+            </a:r>
+            <a:r>
+              <a:rPr lang="en-US" sz="1600" dirty="0">
+                <a:solidFill>
+                  <a:srgbClr val="000000"/>
+                </a:solidFill>
+                <a:latin typeface="Consolas" panose="020B0609020204030204" pitchFamily="49" charset="0"/>
+              </a:rPr>
+              <a:t>&lt;</a:t>
+            </a:r>
+            <a:r>
+              <a:rPr lang="en-US" sz="1600" dirty="0" err="1">
+                <a:solidFill>
+                  <a:srgbClr val="267F99"/>
+                </a:solidFill>
+                <a:latin typeface="Consolas" panose="020B0609020204030204" pitchFamily="49" charset="0"/>
+              </a:rPr>
+              <a:t>IActionResult</a:t>
+            </a:r>
+            <a:r>
+              <a:rPr lang="en-US" sz="1600" dirty="0">
+                <a:solidFill>
+                  <a:srgbClr val="000000"/>
+                </a:solidFill>
+                <a:latin typeface="Consolas" panose="020B0609020204030204" pitchFamily="49" charset="0"/>
+              </a:rPr>
+              <a:t>&gt; </a:t>
+            </a:r>
+            <a:r>
+              <a:rPr lang="en-US" sz="1600" dirty="0">
+                <a:solidFill>
+                  <a:srgbClr val="795E26"/>
+                </a:solidFill>
+                <a:latin typeface="Consolas" panose="020B0609020204030204" pitchFamily="49" charset="0"/>
+              </a:rPr>
+              <a:t>Login</a:t>
+            </a:r>
+            <a:r>
+              <a:rPr lang="en-US" sz="1600" dirty="0">
+                <a:solidFill>
+                  <a:srgbClr val="000000"/>
+                </a:solidFill>
+                <a:latin typeface="Consolas" panose="020B0609020204030204" pitchFamily="49" charset="0"/>
+              </a:rPr>
+              <a:t>(</a:t>
+            </a:r>
+            <a:r>
+              <a:rPr lang="en-US" sz="1600" dirty="0" err="1">
+                <a:solidFill>
+                  <a:srgbClr val="267F99"/>
+                </a:solidFill>
+                <a:latin typeface="Consolas" panose="020B0609020204030204" pitchFamily="49" charset="0"/>
+              </a:rPr>
+              <a:t>LoginModel</a:t>
+            </a:r>
+            <a:r>
+              <a:rPr lang="en-US" sz="1600" dirty="0">
+                <a:solidFill>
+                  <a:srgbClr val="000000"/>
+                </a:solidFill>
+                <a:latin typeface="Consolas" panose="020B0609020204030204" pitchFamily="49" charset="0"/>
+              </a:rPr>
+              <a:t> details) {</a:t>
+            </a:r>
+          </a:p>
+          <a:p>
+            <a:r>
+              <a:rPr lang="en-US" sz="1600" dirty="0">
+                <a:solidFill>
+                  <a:srgbClr val="000000"/>
+                </a:solidFill>
+                <a:latin typeface="Consolas" panose="020B0609020204030204" pitchFamily="49" charset="0"/>
+              </a:rPr>
+              <a:t>        </a:t>
+            </a:r>
+            <a:r>
+              <a:rPr lang="en-US" sz="1600" dirty="0">
+                <a:solidFill>
+                  <a:srgbClr val="AF00DB"/>
+                </a:solidFill>
+                <a:latin typeface="Consolas" panose="020B0609020204030204" pitchFamily="49" charset="0"/>
+              </a:rPr>
+              <a:t>return</a:t>
+            </a:r>
+            <a:r>
+              <a:rPr lang="en-US" sz="1600" dirty="0">
+                <a:solidFill>
+                  <a:srgbClr val="000000"/>
+                </a:solidFill>
+                <a:latin typeface="Consolas" panose="020B0609020204030204" pitchFamily="49" charset="0"/>
+              </a:rPr>
+              <a:t> </a:t>
+            </a:r>
+            <a:r>
+              <a:rPr lang="en-US" sz="1600" dirty="0">
+                <a:solidFill>
+                  <a:srgbClr val="795E26"/>
+                </a:solidFill>
+                <a:latin typeface="Consolas" panose="020B0609020204030204" pitchFamily="49" charset="0"/>
+              </a:rPr>
+              <a:t>View</a:t>
+            </a:r>
+            <a:r>
+              <a:rPr lang="en-US" sz="1600" dirty="0">
+                <a:solidFill>
+                  <a:srgbClr val="000000"/>
+                </a:solidFill>
+                <a:latin typeface="Consolas" panose="020B0609020204030204" pitchFamily="49" charset="0"/>
+              </a:rPr>
+              <a:t>(</a:t>
+            </a:r>
+            <a:r>
+              <a:rPr lang="en-US" sz="1600" dirty="0">
+                <a:solidFill>
+                  <a:srgbClr val="001080"/>
+                </a:solidFill>
+                <a:latin typeface="Consolas" panose="020B0609020204030204" pitchFamily="49" charset="0"/>
+              </a:rPr>
+              <a:t>details</a:t>
+            </a:r>
+            <a:r>
+              <a:rPr lang="en-US" sz="1600" dirty="0">
+                <a:solidFill>
+                  <a:srgbClr val="000000"/>
+                </a:solidFill>
+                <a:latin typeface="Consolas" panose="020B0609020204030204" pitchFamily="49" charset="0"/>
+              </a:rPr>
+              <a:t>);</a:t>
+            </a:r>
+          </a:p>
+          <a:p>
+            <a:r>
+              <a:rPr lang="en-US" sz="1600" dirty="0">
+                <a:solidFill>
+                  <a:srgbClr val="000000"/>
+                </a:solidFill>
+                <a:latin typeface="Consolas" panose="020B0609020204030204" pitchFamily="49" charset="0"/>
+              </a:rPr>
+              <a:t>    }</a:t>
+            </a:r>
+          </a:p>
+          <a:p>
+            <a:r>
+              <a:rPr lang="en-US" sz="1600" dirty="0">
+                <a:solidFill>
+                  <a:srgbClr val="000000"/>
+                </a:solidFill>
+                <a:latin typeface="Consolas" panose="020B0609020204030204" pitchFamily="49" charset="0"/>
+              </a:rPr>
+              <a:t>}</a:t>
+            </a:r>
+            <a:endParaRPr lang="en-US" sz="1600" b="0" dirty="0">
+              <a:solidFill>
+                <a:srgbClr val="000000"/>
+              </a:solidFill>
+              <a:effectLst/>
+              <a:latin typeface="Consolas" panose="020B0609020204030204" pitchFamily="49" charset="0"/>
+            </a:endParaRPr>
           </a:p>
         </p:txBody>
       </p:sp>
     </p:spTree>
     <p:extLst>
       <p:ext uri="{BB962C8B-B14F-4D97-AF65-F5344CB8AC3E}">
-        <p14:creationId xmlns:p14="http://schemas.microsoft.com/office/powerpoint/2010/main" val="2775192845"/>
+        <p14:creationId xmlns:p14="http://schemas.microsoft.com/office/powerpoint/2010/main" val="2739296328"/>
       </p:ext>
     </p:extLst>
   </p:cSld>
@@ -15293,13 +15477,7 @@
       </p:grpSpPr>
       <p:sp>
         <p:nvSpPr>
-          <p:cNvPr id="2" name="Title 1">
-            <a:extLst>
-              <a:ext uri="{FF2B5EF4-FFF2-40B4-BE49-F238E27FC236}">
-                <a16:creationId xmlns:a16="http://schemas.microsoft.com/office/drawing/2014/main" id="{49A40258-F757-45B6-9771-DCF3BF8AC760}"/>
-              </a:ext>
-            </a:extLst>
-          </p:cNvPr>
+          <p:cNvPr id="3" name="Title 2"/>
           <p:cNvSpPr>
             <a:spLocks noGrp="1"/>
           </p:cNvSpPr>
@@ -15319,89 +15497,41 @@
           </a:p>
         </p:txBody>
       </p:sp>
-      <p:sp>
-        <p:nvSpPr>
-          <p:cNvPr id="3" name="Content Placeholder 2">
-            <a:extLst>
-              <a:ext uri="{FF2B5EF4-FFF2-40B4-BE49-F238E27FC236}">
-                <a16:creationId xmlns:a16="http://schemas.microsoft.com/office/drawing/2014/main" id="{411B2AAD-4C05-4AC9-B9B9-5466DE933F01}"/>
-              </a:ext>
-            </a:extLst>
-          </p:cNvPr>
-          <p:cNvSpPr>
-            <a:spLocks noGrp="1"/>
-          </p:cNvSpPr>
+      <p:pic>
+        <p:nvPicPr>
+          <p:cNvPr id="9" name="Content Placeholder 8"/>
+          <p:cNvPicPr>
+            <a:picLocks noGrp="1" noChangeAspect="1"/>
+          </p:cNvPicPr>
           <p:nvPr>
             <p:ph idx="1"/>
           </p:nvPr>
-        </p:nvSpPr>
-        <p:spPr/>
-        <p:txBody>
-          <a:bodyPr/>
-          <a:lstStyle/>
-          <a:p>
-            <a:pPr marL="342900" indent="-342900">
-              <a:buFont typeface="Wingdings" panose="05000000000000000000" pitchFamily="2" charset="2"/>
-              <a:buChar char="§"/>
-            </a:pPr>
-            <a:r>
-              <a:rPr lang="en-US" b="1" dirty="0"/>
-              <a:t>[</a:t>
-            </a:r>
-            <a:r>
-              <a:rPr lang="en-US" b="1" dirty="0" err="1"/>
-              <a:t>IgnoreAntiforgeryToken</a:t>
-            </a:r>
-            <a:r>
-              <a:rPr lang="en-US" b="1" dirty="0"/>
-              <a:t>]</a:t>
-            </a:r>
-          </a:p>
-          <a:p>
-            <a:pPr marL="597150" lvl="1" indent="-342900" algn="just">
-              <a:buFont typeface="Wingdings" panose="05000000000000000000" pitchFamily="2" charset="2"/>
-              <a:buChar char="§"/>
-            </a:pPr>
-            <a:r>
-              <a:rPr lang="en-US" dirty="0"/>
-              <a:t>used to eliminate the need for an </a:t>
-            </a:r>
-            <a:r>
-              <a:rPr lang="en-US" dirty="0" err="1"/>
-              <a:t>antiforgery</a:t>
-            </a:r>
-            <a:r>
-              <a:rPr lang="en-US" dirty="0"/>
-              <a:t> token to be present for a given action (or controller). The filter will override </a:t>
-            </a:r>
-            <a:r>
-              <a:rPr lang="en-US" dirty="0" err="1"/>
-              <a:t>ValidateAntiForgeryToken</a:t>
-            </a:r>
-            <a:r>
-              <a:rPr lang="en-US" dirty="0"/>
-              <a:t> and/or </a:t>
-            </a:r>
-            <a:r>
-              <a:rPr lang="en-US" dirty="0" err="1"/>
-              <a:t>AutoValidateAntiforgeryToken</a:t>
-            </a:r>
-            <a:r>
-              <a:rPr lang="en-US" dirty="0"/>
-              <a:t> filters specified at a higher level (globally or on a controller).</a:t>
-            </a:r>
-          </a:p>
-        </p:txBody>
-      </p:sp>
+        </p:nvPicPr>
+        <p:blipFill>
+          <a:blip r:embed="rId2" cstate="print">
+            <a:extLst>
+              <a:ext uri="{28A0092B-C50C-407E-A947-70E740481C1C}">
+                <a14:useLocalDpi xmlns:a14="http://schemas.microsoft.com/office/drawing/2010/main" val="0"/>
+              </a:ext>
+            </a:extLst>
+          </a:blip>
+          <a:stretch>
+            <a:fillRect/>
+          </a:stretch>
+        </p:blipFill>
+        <p:spPr>
+          <a:xfrm>
+            <a:off x="4655840" y="2420888"/>
+            <a:ext cx="3177851" cy="3177851"/>
+          </a:xfrm>
+          <a:prstGeom prst="rect">
+            <a:avLst/>
+          </a:prstGeom>
+        </p:spPr>
+      </p:pic>
       <p:sp>
         <p:nvSpPr>
-          <p:cNvPr id="4" name="Text Placeholder 3">
-            <a:extLst>
-              <a:ext uri="{FF2B5EF4-FFF2-40B4-BE49-F238E27FC236}">
-                <a16:creationId xmlns:a16="http://schemas.microsoft.com/office/drawing/2014/main" id="{DC7145B7-D0A7-4088-B0AA-B8E481114B38}"/>
-              </a:ext>
-            </a:extLst>
-          </p:cNvPr>
+          <p:cNvPr id="6" name="Text Placeholder 5"/>
           <p:cNvSpPr>
             <a:spLocks noGrp="1"/>
           </p:cNvSpPr>
@@ -15416,455 +15546,15 @@
           <a:p>
             <a:r>
               <a:rPr lang="en-US" dirty="0"/>
-              <a:t>How does ASP.NET Core MVC address CSRF?</a:t>
-            </a:r>
-          </a:p>
-        </p:txBody>
-      </p:sp>
-      <p:sp>
-        <p:nvSpPr>
-          <p:cNvPr id="5" name="Rectangle 4">
-            <a:extLst>
-              <a:ext uri="{FF2B5EF4-FFF2-40B4-BE49-F238E27FC236}">
-                <a16:creationId xmlns:a16="http://schemas.microsoft.com/office/drawing/2014/main" id="{EFE51370-D1F9-4D29-A5D7-6C29B647D2A8}"/>
-              </a:ext>
-            </a:extLst>
-          </p:cNvPr>
-          <p:cNvSpPr/>
-          <p:nvPr/>
-        </p:nvSpPr>
-        <p:spPr>
-          <a:xfrm>
-            <a:off x="1357264" y="3747765"/>
-            <a:ext cx="9649072" cy="2585323"/>
-          </a:xfrm>
-          <a:prstGeom prst="rect">
-            <a:avLst/>
-          </a:prstGeom>
-          <a:solidFill>
-            <a:schemeClr val="bg1"/>
-          </a:solidFill>
-        </p:spPr>
-        <p:txBody>
-          <a:bodyPr wrap="square">
-            <a:spAutoFit/>
-          </a:bodyPr>
-          <a:lstStyle/>
-          <a:p>
-            <a:r>
-              <a:rPr lang="en-US" dirty="0">
-                <a:solidFill>
-                  <a:srgbClr val="000000"/>
-                </a:solidFill>
-                <a:latin typeface="Consolas" panose="020B0609020204030204" pitchFamily="49" charset="0"/>
-              </a:rPr>
-              <a:t>[</a:t>
-            </a:r>
-            <a:r>
-              <a:rPr lang="en-US" dirty="0">
-                <a:solidFill>
-                  <a:srgbClr val="267F99"/>
-                </a:solidFill>
-                <a:latin typeface="Consolas" panose="020B0609020204030204" pitchFamily="49" charset="0"/>
-              </a:rPr>
-              <a:t>Authorize</a:t>
-            </a:r>
-            <a:r>
-              <a:rPr lang="en-US" dirty="0">
-                <a:solidFill>
-                  <a:srgbClr val="000000"/>
-                </a:solidFill>
-                <a:latin typeface="Consolas" panose="020B0609020204030204" pitchFamily="49" charset="0"/>
-              </a:rPr>
-              <a:t>]</a:t>
-            </a:r>
-          </a:p>
-          <a:p>
-            <a:r>
-              <a:rPr lang="en-US" dirty="0">
-                <a:solidFill>
-                  <a:srgbClr val="000000"/>
-                </a:solidFill>
-                <a:highlight>
-                  <a:srgbClr val="FFFF00"/>
-                </a:highlight>
-                <a:latin typeface="Consolas" panose="020B0609020204030204" pitchFamily="49" charset="0"/>
-              </a:rPr>
-              <a:t>[</a:t>
-            </a:r>
-            <a:r>
-              <a:rPr lang="en-US" dirty="0" err="1">
-                <a:solidFill>
-                  <a:srgbClr val="267F99"/>
-                </a:solidFill>
-                <a:highlight>
-                  <a:srgbClr val="FFFF00"/>
-                </a:highlight>
-                <a:latin typeface="Consolas" panose="020B0609020204030204" pitchFamily="49" charset="0"/>
-              </a:rPr>
-              <a:t>AutoValidateAntiforgeryToken</a:t>
-            </a:r>
-            <a:r>
-              <a:rPr lang="en-US" dirty="0">
-                <a:solidFill>
-                  <a:srgbClr val="000000"/>
-                </a:solidFill>
-                <a:highlight>
-                  <a:srgbClr val="FFFF00"/>
-                </a:highlight>
-                <a:latin typeface="Consolas" panose="020B0609020204030204" pitchFamily="49" charset="0"/>
-              </a:rPr>
-              <a:t>]</a:t>
-            </a:r>
-          </a:p>
-          <a:p>
-            <a:r>
-              <a:rPr lang="en-US" dirty="0">
-                <a:solidFill>
-                  <a:srgbClr val="0000FF"/>
-                </a:solidFill>
-                <a:latin typeface="Consolas" panose="020B0609020204030204" pitchFamily="49" charset="0"/>
-              </a:rPr>
-              <a:t>public</a:t>
-            </a:r>
-            <a:r>
-              <a:rPr lang="en-US" dirty="0">
-                <a:solidFill>
-                  <a:srgbClr val="000000"/>
-                </a:solidFill>
-                <a:latin typeface="Consolas" panose="020B0609020204030204" pitchFamily="49" charset="0"/>
-              </a:rPr>
-              <a:t> </a:t>
-            </a:r>
-            <a:r>
-              <a:rPr lang="en-US" dirty="0">
-                <a:solidFill>
-                  <a:srgbClr val="0000FF"/>
-                </a:solidFill>
-                <a:latin typeface="Consolas" panose="020B0609020204030204" pitchFamily="49" charset="0"/>
-              </a:rPr>
-              <a:t>class</a:t>
-            </a:r>
-            <a:r>
-              <a:rPr lang="en-US" dirty="0">
-                <a:solidFill>
-                  <a:srgbClr val="000000"/>
-                </a:solidFill>
-                <a:latin typeface="Consolas" panose="020B0609020204030204" pitchFamily="49" charset="0"/>
-              </a:rPr>
-              <a:t> </a:t>
-            </a:r>
-            <a:r>
-              <a:rPr lang="en-US" dirty="0" err="1">
-                <a:solidFill>
-                  <a:srgbClr val="267F99"/>
-                </a:solidFill>
-                <a:latin typeface="Consolas" panose="020B0609020204030204" pitchFamily="49" charset="0"/>
-              </a:rPr>
-              <a:t>ManageController</a:t>
-            </a:r>
-            <a:r>
-              <a:rPr lang="en-US" dirty="0">
-                <a:solidFill>
-                  <a:srgbClr val="000000"/>
-                </a:solidFill>
-                <a:latin typeface="Consolas" panose="020B0609020204030204" pitchFamily="49" charset="0"/>
-              </a:rPr>
-              <a:t> : </a:t>
-            </a:r>
-            <a:r>
-              <a:rPr lang="en-US" dirty="0">
-                <a:solidFill>
-                  <a:srgbClr val="267F99"/>
-                </a:solidFill>
-                <a:latin typeface="Consolas" panose="020B0609020204030204" pitchFamily="49" charset="0"/>
-              </a:rPr>
-              <a:t>Controller</a:t>
-            </a:r>
-            <a:r>
-              <a:rPr lang="en-US" dirty="0">
-                <a:solidFill>
-                  <a:srgbClr val="000000"/>
-                </a:solidFill>
-                <a:latin typeface="Consolas" panose="020B0609020204030204" pitchFamily="49" charset="0"/>
-              </a:rPr>
-              <a:t>{</a:t>
-            </a:r>
-          </a:p>
-          <a:p>
-            <a:r>
-              <a:rPr lang="en-US" dirty="0">
-                <a:solidFill>
-                  <a:srgbClr val="000000"/>
-                </a:solidFill>
-                <a:latin typeface="Consolas" panose="020B0609020204030204" pitchFamily="49" charset="0"/>
-              </a:rPr>
-              <a:t>    [</a:t>
-            </a:r>
-            <a:r>
-              <a:rPr lang="en-US" dirty="0" err="1">
-                <a:solidFill>
-                  <a:srgbClr val="267F99"/>
-                </a:solidFill>
-                <a:latin typeface="Consolas" panose="020B0609020204030204" pitchFamily="49" charset="0"/>
-              </a:rPr>
-              <a:t>HttpPost</a:t>
-            </a:r>
-            <a:r>
-              <a:rPr lang="en-US" dirty="0">
-                <a:solidFill>
-                  <a:srgbClr val="000000"/>
-                </a:solidFill>
-                <a:latin typeface="Consolas" panose="020B0609020204030204" pitchFamily="49" charset="0"/>
-              </a:rPr>
-              <a:t>]</a:t>
-            </a:r>
-          </a:p>
-          <a:p>
-            <a:r>
-              <a:rPr lang="en-US" dirty="0">
-                <a:solidFill>
-                  <a:srgbClr val="000000"/>
-                </a:solidFill>
-                <a:latin typeface="Consolas" panose="020B0609020204030204" pitchFamily="49" charset="0"/>
-              </a:rPr>
-              <a:t>   </a:t>
-            </a:r>
-            <a:r>
-              <a:rPr lang="en-US" dirty="0">
-                <a:solidFill>
-                  <a:srgbClr val="000000"/>
-                </a:solidFill>
-                <a:highlight>
-                  <a:srgbClr val="FFFF00"/>
-                </a:highlight>
-                <a:latin typeface="Consolas" panose="020B0609020204030204" pitchFamily="49" charset="0"/>
-              </a:rPr>
-              <a:t> [</a:t>
-            </a:r>
-            <a:r>
-              <a:rPr lang="en-US" dirty="0" err="1">
-                <a:solidFill>
-                  <a:srgbClr val="267F99"/>
-                </a:solidFill>
-                <a:highlight>
-                  <a:srgbClr val="FFFF00"/>
-                </a:highlight>
-                <a:latin typeface="Consolas" panose="020B0609020204030204" pitchFamily="49" charset="0"/>
-              </a:rPr>
-              <a:t>IgnoreAntiforgeryToken</a:t>
-            </a:r>
-            <a:r>
-              <a:rPr lang="en-US" dirty="0">
-                <a:solidFill>
-                  <a:srgbClr val="000000"/>
-                </a:solidFill>
-                <a:highlight>
-                  <a:srgbClr val="FFFF00"/>
-                </a:highlight>
-                <a:latin typeface="Consolas" panose="020B0609020204030204" pitchFamily="49" charset="0"/>
-              </a:rPr>
-              <a:t>]</a:t>
-            </a:r>
-          </a:p>
-          <a:p>
-            <a:r>
-              <a:rPr lang="en-US" dirty="0">
-                <a:solidFill>
-                  <a:srgbClr val="000000"/>
-                </a:solidFill>
-                <a:latin typeface="Consolas" panose="020B0609020204030204" pitchFamily="49" charset="0"/>
-              </a:rPr>
-              <a:t>    </a:t>
-            </a:r>
-            <a:r>
-              <a:rPr lang="en-US" dirty="0">
-                <a:solidFill>
-                  <a:srgbClr val="0000FF"/>
-                </a:solidFill>
-                <a:latin typeface="Consolas" panose="020B0609020204030204" pitchFamily="49" charset="0"/>
-              </a:rPr>
-              <a:t>public</a:t>
-            </a:r>
-            <a:r>
-              <a:rPr lang="en-US" dirty="0">
-                <a:solidFill>
-                  <a:srgbClr val="000000"/>
-                </a:solidFill>
-                <a:latin typeface="Consolas" panose="020B0609020204030204" pitchFamily="49" charset="0"/>
-              </a:rPr>
-              <a:t> </a:t>
-            </a:r>
-            <a:r>
-              <a:rPr lang="en-US" dirty="0" err="1">
-                <a:solidFill>
-                  <a:srgbClr val="0000FF"/>
-                </a:solidFill>
-                <a:latin typeface="Consolas" panose="020B0609020204030204" pitchFamily="49" charset="0"/>
-              </a:rPr>
-              <a:t>async</a:t>
-            </a:r>
-            <a:r>
-              <a:rPr lang="en-US" dirty="0">
-                <a:solidFill>
-                  <a:srgbClr val="000000"/>
-                </a:solidFill>
-                <a:latin typeface="Consolas" panose="020B0609020204030204" pitchFamily="49" charset="0"/>
-              </a:rPr>
-              <a:t> </a:t>
-            </a:r>
-            <a:r>
-              <a:rPr lang="en-US" dirty="0">
-                <a:solidFill>
-                  <a:srgbClr val="267F99"/>
-                </a:solidFill>
-                <a:latin typeface="Consolas" panose="020B0609020204030204" pitchFamily="49" charset="0"/>
-              </a:rPr>
-              <a:t>Task</a:t>
-            </a:r>
-            <a:r>
-              <a:rPr lang="en-US" dirty="0">
-                <a:solidFill>
-                  <a:srgbClr val="000000"/>
-                </a:solidFill>
-                <a:latin typeface="Consolas" panose="020B0609020204030204" pitchFamily="49" charset="0"/>
-              </a:rPr>
-              <a:t>&lt;</a:t>
-            </a:r>
-            <a:r>
-              <a:rPr lang="en-US" dirty="0" err="1">
-                <a:solidFill>
-                  <a:srgbClr val="267F99"/>
-                </a:solidFill>
-                <a:latin typeface="Consolas" panose="020B0609020204030204" pitchFamily="49" charset="0"/>
-              </a:rPr>
-              <a:t>IActionResult</a:t>
-            </a:r>
-            <a:r>
-              <a:rPr lang="en-US" dirty="0">
-                <a:solidFill>
-                  <a:srgbClr val="000000"/>
-                </a:solidFill>
-                <a:latin typeface="Consolas" panose="020B0609020204030204" pitchFamily="49" charset="0"/>
-              </a:rPr>
-              <a:t>&gt; </a:t>
-            </a:r>
-            <a:r>
-              <a:rPr lang="en-US" dirty="0" err="1">
-                <a:solidFill>
-                  <a:srgbClr val="795E26"/>
-                </a:solidFill>
-                <a:latin typeface="Consolas" panose="020B0609020204030204" pitchFamily="49" charset="0"/>
-              </a:rPr>
-              <a:t>DoSomethingSafe</a:t>
-            </a:r>
-            <a:r>
-              <a:rPr lang="en-US" dirty="0">
-                <a:solidFill>
-                  <a:srgbClr val="000000"/>
-                </a:solidFill>
-                <a:latin typeface="Consolas" panose="020B0609020204030204" pitchFamily="49" charset="0"/>
-              </a:rPr>
-              <a:t>(</a:t>
-            </a:r>
-            <a:r>
-              <a:rPr lang="en-US" dirty="0" err="1">
-                <a:solidFill>
-                  <a:srgbClr val="267F99"/>
-                </a:solidFill>
-                <a:latin typeface="Consolas" panose="020B0609020204030204" pitchFamily="49" charset="0"/>
-              </a:rPr>
-              <a:t>SomeViewModel</a:t>
-            </a:r>
-            <a:r>
-              <a:rPr lang="en-US" dirty="0">
-                <a:solidFill>
-                  <a:srgbClr val="000000"/>
-                </a:solidFill>
-                <a:latin typeface="Consolas" panose="020B0609020204030204" pitchFamily="49" charset="0"/>
-              </a:rPr>
-              <a:t> model){</a:t>
-            </a:r>
-          </a:p>
-          <a:p>
-            <a:r>
-              <a:rPr lang="en-US" dirty="0">
-                <a:solidFill>
-                  <a:srgbClr val="000000"/>
-                </a:solidFill>
-                <a:latin typeface="Consolas" panose="020B0609020204030204" pitchFamily="49" charset="0"/>
-              </a:rPr>
-              <a:t>    </a:t>
-            </a:r>
-            <a:r>
-              <a:rPr lang="en-US" dirty="0">
-                <a:solidFill>
-                  <a:srgbClr val="008000"/>
-                </a:solidFill>
-                <a:latin typeface="Consolas" panose="020B0609020204030204" pitchFamily="49" charset="0"/>
-              </a:rPr>
-              <a:t>// no </a:t>
-            </a:r>
-            <a:r>
-              <a:rPr lang="en-US" dirty="0" err="1">
-                <a:solidFill>
-                  <a:srgbClr val="008000"/>
-                </a:solidFill>
-                <a:latin typeface="Consolas" panose="020B0609020204030204" pitchFamily="49" charset="0"/>
-              </a:rPr>
-              <a:t>antiforgery</a:t>
-            </a:r>
-            <a:r>
-              <a:rPr lang="en-US" dirty="0">
-                <a:solidFill>
-                  <a:srgbClr val="008000"/>
-                </a:solidFill>
-                <a:latin typeface="Consolas" panose="020B0609020204030204" pitchFamily="49" charset="0"/>
-              </a:rPr>
-              <a:t> token required</a:t>
-            </a:r>
-            <a:endParaRPr lang="en-US" dirty="0">
-              <a:solidFill>
-                <a:srgbClr val="000000"/>
-              </a:solidFill>
-              <a:latin typeface="Consolas" panose="020B0609020204030204" pitchFamily="49" charset="0"/>
-            </a:endParaRPr>
-          </a:p>
-          <a:p>
-            <a:r>
-              <a:rPr lang="en-US" dirty="0">
-                <a:solidFill>
-                  <a:srgbClr val="000000"/>
-                </a:solidFill>
-                <a:latin typeface="Consolas" panose="020B0609020204030204" pitchFamily="49" charset="0"/>
-              </a:rPr>
-              <a:t>    }</a:t>
-            </a:r>
-          </a:p>
-          <a:p>
-            <a:r>
-              <a:rPr lang="en-US" dirty="0">
-                <a:solidFill>
-                  <a:srgbClr val="000000"/>
-                </a:solidFill>
-                <a:latin typeface="Consolas" panose="020B0609020204030204" pitchFamily="49" charset="0"/>
-              </a:rPr>
-              <a:t>}</a:t>
-            </a:r>
-            <a:endParaRPr lang="en-US" b="0" dirty="0">
-              <a:solidFill>
-                <a:srgbClr val="000000"/>
-              </a:solidFill>
-              <a:effectLst/>
-              <a:latin typeface="Consolas" panose="020B0609020204030204" pitchFamily="49" charset="0"/>
-            </a:endParaRPr>
+              <a:t>Demo</a:t>
+            </a:r>
           </a:p>
         </p:txBody>
       </p:sp>
     </p:spTree>
     <p:extLst>
       <p:ext uri="{BB962C8B-B14F-4D97-AF65-F5344CB8AC3E}">
-        <p14:creationId xmlns:p14="http://schemas.microsoft.com/office/powerpoint/2010/main" val="2484118491"/>
+        <p14:creationId xmlns:p14="http://schemas.microsoft.com/office/powerpoint/2010/main" val="2775192845"/>
       </p:ext>
     </p:extLst>
   </p:cSld>
@@ -15984,7 +15674,15 @@
             </a:r>
             <a:r>
               <a:rPr lang="en-US" dirty="0"/>
-              <a:t> tokens for certain kinds of HTTP requests, such as GET requests. Instead of broadly applying the </a:t>
+              <a:t> tokens for certain kinds of HTTP requests, such as </a:t>
+            </a:r>
+            <a:r>
+              <a:rPr lang="en-US" b="1" dirty="0"/>
+              <a:t>GET</a:t>
+            </a:r>
+            <a:r>
+              <a:rPr lang="en-US" dirty="0"/>
+              <a:t> requests. Instead of broadly applying the </a:t>
             </a:r>
             <a:r>
               <a:rPr lang="en-US" dirty="0" err="1"/>
@@ -16127,7 +15825,13 @@
       </p:grpSpPr>
       <p:sp>
         <p:nvSpPr>
-          <p:cNvPr id="2" name="Title 1"/>
+          <p:cNvPr id="2" name="Title 1">
+            <a:extLst>
+              <a:ext uri="{FF2B5EF4-FFF2-40B4-BE49-F238E27FC236}">
+                <a16:creationId xmlns:a16="http://schemas.microsoft.com/office/drawing/2014/main" id="{49A40258-F757-45B6-9771-DCF3BF8AC760}"/>
+              </a:ext>
+            </a:extLst>
+          </p:cNvPr>
           <p:cNvSpPr>
             <a:spLocks noGrp="1"/>
           </p:cNvSpPr>
@@ -16144,13 +15848,18 @@
               <a:rPr lang="en-US" dirty="0"/>
               <a:t>Cross-Site Request forgery</a:t>
             </a:r>
-            <a:endParaRPr lang="ro-RO" dirty="0"/>
           </a:p>
         </p:txBody>
       </p:sp>
       <p:sp>
         <p:nvSpPr>
-          <p:cNvPr id="3" name="Content Placeholder 2"/>
+          <p:cNvPr id="3" name="Content Placeholder 2">
+            <a:extLst>
+              <a:ext uri="{FF2B5EF4-FFF2-40B4-BE49-F238E27FC236}">
+                <a16:creationId xmlns:a16="http://schemas.microsoft.com/office/drawing/2014/main" id="{411B2AAD-4C05-4AC9-B9B9-5466DE933F01}"/>
+              </a:ext>
+            </a:extLst>
+          </p:cNvPr>
           <p:cNvSpPr>
             <a:spLocks noGrp="1"/>
           </p:cNvSpPr>
@@ -16168,57 +15877,60 @@
               <a:buChar char="§"/>
             </a:pPr>
             <a:r>
-              <a:rPr lang="en-US" dirty="0"/>
-              <a:t>JavaScript, AJAX, and SPAs (including </a:t>
-            </a:r>
-            <a:r>
               <a:rPr lang="en-US" b="1" dirty="0"/>
-              <a:t>Angular</a:t>
-            </a:r>
-            <a:r>
-              <a:rPr lang="en-US" dirty="0"/>
-              <a:t>): </a:t>
-            </a:r>
-            <a:r>
-              <a:rPr lang="en-US" dirty="0">
-                <a:hlinkClick r:id="rId3"/>
-              </a:rPr>
-              <a:t>link</a:t>
-            </a:r>
-            <a:endParaRPr lang="en-US" dirty="0"/>
-          </a:p>
-          <a:p>
-            <a:pPr marL="342900" indent="-342900">
+              <a:t>[</a:t>
+            </a:r>
+            <a:r>
+              <a:rPr lang="en-US" b="1" dirty="0" err="1"/>
+              <a:t>IgnoreAntiforgeryToken</a:t>
+            </a:r>
+            <a:r>
+              <a:rPr lang="en-US" b="1" dirty="0"/>
+              <a:t>]</a:t>
+            </a:r>
+          </a:p>
+          <a:p>
+            <a:pPr marL="597150" lvl="1" indent="-342900" algn="just">
               <a:buFont typeface="Wingdings" panose="05000000000000000000" pitchFamily="2" charset="2"/>
               <a:buChar char="§"/>
             </a:pPr>
-            <a:endParaRPr lang="en-US" dirty="0"/>
-          </a:p>
-          <a:p>
-            <a:pPr marL="342900" indent="-342900">
-              <a:buFont typeface="Wingdings" panose="05000000000000000000" pitchFamily="2" charset="2"/>
-              <a:buChar char="§"/>
-            </a:pPr>
             <a:r>
               <a:rPr lang="en-US" dirty="0"/>
-              <a:t>Further reading: </a:t>
-            </a:r>
-            <a:r>
-              <a:rPr lang="en-US" dirty="0">
-                <a:hlinkClick r:id="rId4"/>
-              </a:rPr>
-              <a:t>https://docs.microsoft.com/en-us/aspnet/core/security/anti-request-forgery?view=aspnetcore-2.0</a:t>
-            </a:r>
-            <a:endParaRPr lang="en-US" dirty="0"/>
+              <a:t>used to eliminate the need for an </a:t>
+            </a:r>
+            <a:r>
+              <a:rPr lang="en-US" dirty="0" err="1"/>
+              <a:t>antiforgery</a:t>
+            </a:r>
+            <a:r>
+              <a:rPr lang="en-US" dirty="0"/>
+              <a:t> token to be present for a given action (or controller). The filter will override </a:t>
+            </a:r>
+            <a:r>
+              <a:rPr lang="en-US" dirty="0" err="1"/>
+              <a:t>ValidateAntiForgeryToken</a:t>
+            </a:r>
+            <a:r>
+              <a:rPr lang="en-US" dirty="0"/>
+              <a:t> and/or </a:t>
+            </a:r>
+            <a:r>
+              <a:rPr lang="en-US" dirty="0" err="1"/>
+              <a:t>AutoValidateAntiforgeryToken</a:t>
+            </a:r>
+            <a:r>
+              <a:rPr lang="en-US" dirty="0"/>
+              <a:t> filters specified at a higher level (globally or on a controller).</a:t>
+            </a:r>
           </a:p>
         </p:txBody>
       </p:sp>
       <p:sp>
         <p:nvSpPr>
-          <p:cNvPr id="5" name="Text Placeholder 4">
+          <p:cNvPr id="4" name="Text Placeholder 3">
             <a:extLst>
               <a:ext uri="{FF2B5EF4-FFF2-40B4-BE49-F238E27FC236}">
-                <a16:creationId xmlns:a16="http://schemas.microsoft.com/office/drawing/2014/main" id="{52A29470-1D14-4DB4-B2EB-AC6AD725BE5C}"/>
+                <a16:creationId xmlns:a16="http://schemas.microsoft.com/office/drawing/2014/main" id="{DC7145B7-D0A7-4088-B0AA-B8E481114B38}"/>
               </a:ext>
             </a:extLst>
           </p:cNvPr>
@@ -16241,10 +15953,450 @@
           </a:p>
         </p:txBody>
       </p:sp>
+      <p:sp>
+        <p:nvSpPr>
+          <p:cNvPr id="5" name="Rectangle 4">
+            <a:extLst>
+              <a:ext uri="{FF2B5EF4-FFF2-40B4-BE49-F238E27FC236}">
+                <a16:creationId xmlns:a16="http://schemas.microsoft.com/office/drawing/2014/main" id="{EFE51370-D1F9-4D29-A5D7-6C29B647D2A8}"/>
+              </a:ext>
+            </a:extLst>
+          </p:cNvPr>
+          <p:cNvSpPr/>
+          <p:nvPr/>
+        </p:nvSpPr>
+        <p:spPr>
+          <a:xfrm>
+            <a:off x="1357264" y="3747765"/>
+            <a:ext cx="9649072" cy="2585323"/>
+          </a:xfrm>
+          <a:prstGeom prst="rect">
+            <a:avLst/>
+          </a:prstGeom>
+          <a:solidFill>
+            <a:schemeClr val="bg1"/>
+          </a:solidFill>
+        </p:spPr>
+        <p:txBody>
+          <a:bodyPr wrap="square">
+            <a:spAutoFit/>
+          </a:bodyPr>
+          <a:lstStyle/>
+          <a:p>
+            <a:r>
+              <a:rPr lang="en-US" dirty="0">
+                <a:solidFill>
+                  <a:srgbClr val="000000"/>
+                </a:solidFill>
+                <a:latin typeface="Consolas" panose="020B0609020204030204" pitchFamily="49" charset="0"/>
+              </a:rPr>
+              <a:t>[</a:t>
+            </a:r>
+            <a:r>
+              <a:rPr lang="en-US" dirty="0">
+                <a:solidFill>
+                  <a:srgbClr val="267F99"/>
+                </a:solidFill>
+                <a:latin typeface="Consolas" panose="020B0609020204030204" pitchFamily="49" charset="0"/>
+              </a:rPr>
+              <a:t>Authorize</a:t>
+            </a:r>
+            <a:r>
+              <a:rPr lang="en-US" dirty="0">
+                <a:solidFill>
+                  <a:srgbClr val="000000"/>
+                </a:solidFill>
+                <a:latin typeface="Consolas" panose="020B0609020204030204" pitchFamily="49" charset="0"/>
+              </a:rPr>
+              <a:t>]</a:t>
+            </a:r>
+          </a:p>
+          <a:p>
+            <a:r>
+              <a:rPr lang="en-US" dirty="0">
+                <a:solidFill>
+                  <a:srgbClr val="000000"/>
+                </a:solidFill>
+                <a:highlight>
+                  <a:srgbClr val="FFFF00"/>
+                </a:highlight>
+                <a:latin typeface="Consolas" panose="020B0609020204030204" pitchFamily="49" charset="0"/>
+              </a:rPr>
+              <a:t>[</a:t>
+            </a:r>
+            <a:r>
+              <a:rPr lang="en-US" dirty="0" err="1">
+                <a:solidFill>
+                  <a:srgbClr val="267F99"/>
+                </a:solidFill>
+                <a:highlight>
+                  <a:srgbClr val="FFFF00"/>
+                </a:highlight>
+                <a:latin typeface="Consolas" panose="020B0609020204030204" pitchFamily="49" charset="0"/>
+              </a:rPr>
+              <a:t>AutoValidateAntiforgeryToken</a:t>
+            </a:r>
+            <a:r>
+              <a:rPr lang="en-US" dirty="0">
+                <a:solidFill>
+                  <a:srgbClr val="000000"/>
+                </a:solidFill>
+                <a:highlight>
+                  <a:srgbClr val="FFFF00"/>
+                </a:highlight>
+                <a:latin typeface="Consolas" panose="020B0609020204030204" pitchFamily="49" charset="0"/>
+              </a:rPr>
+              <a:t>]</a:t>
+            </a:r>
+          </a:p>
+          <a:p>
+            <a:r>
+              <a:rPr lang="en-US" dirty="0">
+                <a:solidFill>
+                  <a:srgbClr val="0000FF"/>
+                </a:solidFill>
+                <a:latin typeface="Consolas" panose="020B0609020204030204" pitchFamily="49" charset="0"/>
+              </a:rPr>
+              <a:t>public</a:t>
+            </a:r>
+            <a:r>
+              <a:rPr lang="en-US" dirty="0">
+                <a:solidFill>
+                  <a:srgbClr val="000000"/>
+                </a:solidFill>
+                <a:latin typeface="Consolas" panose="020B0609020204030204" pitchFamily="49" charset="0"/>
+              </a:rPr>
+              <a:t> </a:t>
+            </a:r>
+            <a:r>
+              <a:rPr lang="en-US" dirty="0">
+                <a:solidFill>
+                  <a:srgbClr val="0000FF"/>
+                </a:solidFill>
+                <a:latin typeface="Consolas" panose="020B0609020204030204" pitchFamily="49" charset="0"/>
+              </a:rPr>
+              <a:t>class</a:t>
+            </a:r>
+            <a:r>
+              <a:rPr lang="en-US" dirty="0">
+                <a:solidFill>
+                  <a:srgbClr val="000000"/>
+                </a:solidFill>
+                <a:latin typeface="Consolas" panose="020B0609020204030204" pitchFamily="49" charset="0"/>
+              </a:rPr>
+              <a:t> </a:t>
+            </a:r>
+            <a:r>
+              <a:rPr lang="en-US" dirty="0" err="1">
+                <a:solidFill>
+                  <a:srgbClr val="267F99"/>
+                </a:solidFill>
+                <a:latin typeface="Consolas" panose="020B0609020204030204" pitchFamily="49" charset="0"/>
+              </a:rPr>
+              <a:t>ManageController</a:t>
+            </a:r>
+            <a:r>
+              <a:rPr lang="en-US" dirty="0">
+                <a:solidFill>
+                  <a:srgbClr val="000000"/>
+                </a:solidFill>
+                <a:latin typeface="Consolas" panose="020B0609020204030204" pitchFamily="49" charset="0"/>
+              </a:rPr>
+              <a:t> : </a:t>
+            </a:r>
+            <a:r>
+              <a:rPr lang="en-US" dirty="0">
+                <a:solidFill>
+                  <a:srgbClr val="267F99"/>
+                </a:solidFill>
+                <a:latin typeface="Consolas" panose="020B0609020204030204" pitchFamily="49" charset="0"/>
+              </a:rPr>
+              <a:t>Controller</a:t>
+            </a:r>
+            <a:r>
+              <a:rPr lang="en-US" dirty="0">
+                <a:solidFill>
+                  <a:srgbClr val="000000"/>
+                </a:solidFill>
+                <a:latin typeface="Consolas" panose="020B0609020204030204" pitchFamily="49" charset="0"/>
+              </a:rPr>
+              <a:t>{</a:t>
+            </a:r>
+          </a:p>
+          <a:p>
+            <a:r>
+              <a:rPr lang="en-US" dirty="0">
+                <a:solidFill>
+                  <a:srgbClr val="000000"/>
+                </a:solidFill>
+                <a:latin typeface="Consolas" panose="020B0609020204030204" pitchFamily="49" charset="0"/>
+              </a:rPr>
+              <a:t>    [</a:t>
+            </a:r>
+            <a:r>
+              <a:rPr lang="en-US" dirty="0" err="1">
+                <a:solidFill>
+                  <a:srgbClr val="267F99"/>
+                </a:solidFill>
+                <a:latin typeface="Consolas" panose="020B0609020204030204" pitchFamily="49" charset="0"/>
+              </a:rPr>
+              <a:t>HttpPost</a:t>
+            </a:r>
+            <a:r>
+              <a:rPr lang="en-US" dirty="0">
+                <a:solidFill>
+                  <a:srgbClr val="000000"/>
+                </a:solidFill>
+                <a:latin typeface="Consolas" panose="020B0609020204030204" pitchFamily="49" charset="0"/>
+              </a:rPr>
+              <a:t>]</a:t>
+            </a:r>
+          </a:p>
+          <a:p>
+            <a:r>
+              <a:rPr lang="en-US" dirty="0">
+                <a:solidFill>
+                  <a:srgbClr val="000000"/>
+                </a:solidFill>
+                <a:latin typeface="Consolas" panose="020B0609020204030204" pitchFamily="49" charset="0"/>
+              </a:rPr>
+              <a:t>   </a:t>
+            </a:r>
+            <a:r>
+              <a:rPr lang="en-US" dirty="0">
+                <a:solidFill>
+                  <a:srgbClr val="000000"/>
+                </a:solidFill>
+                <a:highlight>
+                  <a:srgbClr val="FFFF00"/>
+                </a:highlight>
+                <a:latin typeface="Consolas" panose="020B0609020204030204" pitchFamily="49" charset="0"/>
+              </a:rPr>
+              <a:t> [</a:t>
+            </a:r>
+            <a:r>
+              <a:rPr lang="en-US" dirty="0" err="1">
+                <a:solidFill>
+                  <a:srgbClr val="267F99"/>
+                </a:solidFill>
+                <a:highlight>
+                  <a:srgbClr val="FFFF00"/>
+                </a:highlight>
+                <a:latin typeface="Consolas" panose="020B0609020204030204" pitchFamily="49" charset="0"/>
+              </a:rPr>
+              <a:t>IgnoreAntiforgeryToken</a:t>
+            </a:r>
+            <a:r>
+              <a:rPr lang="en-US" dirty="0">
+                <a:solidFill>
+                  <a:srgbClr val="000000"/>
+                </a:solidFill>
+                <a:highlight>
+                  <a:srgbClr val="FFFF00"/>
+                </a:highlight>
+                <a:latin typeface="Consolas" panose="020B0609020204030204" pitchFamily="49" charset="0"/>
+              </a:rPr>
+              <a:t>]</a:t>
+            </a:r>
+          </a:p>
+          <a:p>
+            <a:r>
+              <a:rPr lang="en-US" dirty="0">
+                <a:solidFill>
+                  <a:srgbClr val="000000"/>
+                </a:solidFill>
+                <a:latin typeface="Consolas" panose="020B0609020204030204" pitchFamily="49" charset="0"/>
+              </a:rPr>
+              <a:t>    </a:t>
+            </a:r>
+            <a:r>
+              <a:rPr lang="en-US" dirty="0">
+                <a:solidFill>
+                  <a:srgbClr val="0000FF"/>
+                </a:solidFill>
+                <a:latin typeface="Consolas" panose="020B0609020204030204" pitchFamily="49" charset="0"/>
+              </a:rPr>
+              <a:t>public</a:t>
+            </a:r>
+            <a:r>
+              <a:rPr lang="en-US" dirty="0">
+                <a:solidFill>
+                  <a:srgbClr val="000000"/>
+                </a:solidFill>
+                <a:latin typeface="Consolas" panose="020B0609020204030204" pitchFamily="49" charset="0"/>
+              </a:rPr>
+              <a:t> </a:t>
+            </a:r>
+            <a:r>
+              <a:rPr lang="en-US" dirty="0" err="1">
+                <a:solidFill>
+                  <a:srgbClr val="0000FF"/>
+                </a:solidFill>
+                <a:latin typeface="Consolas" panose="020B0609020204030204" pitchFamily="49" charset="0"/>
+              </a:rPr>
+              <a:t>async</a:t>
+            </a:r>
+            <a:r>
+              <a:rPr lang="en-US" dirty="0">
+                <a:solidFill>
+                  <a:srgbClr val="000000"/>
+                </a:solidFill>
+                <a:latin typeface="Consolas" panose="020B0609020204030204" pitchFamily="49" charset="0"/>
+              </a:rPr>
+              <a:t> </a:t>
+            </a:r>
+            <a:r>
+              <a:rPr lang="en-US" dirty="0">
+                <a:solidFill>
+                  <a:srgbClr val="267F99"/>
+                </a:solidFill>
+                <a:latin typeface="Consolas" panose="020B0609020204030204" pitchFamily="49" charset="0"/>
+              </a:rPr>
+              <a:t>Task</a:t>
+            </a:r>
+            <a:r>
+              <a:rPr lang="en-US" dirty="0">
+                <a:solidFill>
+                  <a:srgbClr val="000000"/>
+                </a:solidFill>
+                <a:latin typeface="Consolas" panose="020B0609020204030204" pitchFamily="49" charset="0"/>
+              </a:rPr>
+              <a:t>&lt;</a:t>
+            </a:r>
+            <a:r>
+              <a:rPr lang="en-US" dirty="0" err="1">
+                <a:solidFill>
+                  <a:srgbClr val="267F99"/>
+                </a:solidFill>
+                <a:latin typeface="Consolas" panose="020B0609020204030204" pitchFamily="49" charset="0"/>
+              </a:rPr>
+              <a:t>IActionResult</a:t>
+            </a:r>
+            <a:r>
+              <a:rPr lang="en-US" dirty="0">
+                <a:solidFill>
+                  <a:srgbClr val="000000"/>
+                </a:solidFill>
+                <a:latin typeface="Consolas" panose="020B0609020204030204" pitchFamily="49" charset="0"/>
+              </a:rPr>
+              <a:t>&gt; </a:t>
+            </a:r>
+            <a:r>
+              <a:rPr lang="en-US" dirty="0" err="1">
+                <a:solidFill>
+                  <a:srgbClr val="795E26"/>
+                </a:solidFill>
+                <a:latin typeface="Consolas" panose="020B0609020204030204" pitchFamily="49" charset="0"/>
+              </a:rPr>
+              <a:t>DoSomethingSafe</a:t>
+            </a:r>
+            <a:r>
+              <a:rPr lang="en-US" dirty="0">
+                <a:solidFill>
+                  <a:srgbClr val="000000"/>
+                </a:solidFill>
+                <a:latin typeface="Consolas" panose="020B0609020204030204" pitchFamily="49" charset="0"/>
+              </a:rPr>
+              <a:t>(</a:t>
+            </a:r>
+            <a:r>
+              <a:rPr lang="en-US" dirty="0" err="1">
+                <a:solidFill>
+                  <a:srgbClr val="267F99"/>
+                </a:solidFill>
+                <a:latin typeface="Consolas" panose="020B0609020204030204" pitchFamily="49" charset="0"/>
+              </a:rPr>
+              <a:t>SomeViewModel</a:t>
+            </a:r>
+            <a:r>
+              <a:rPr lang="en-US" dirty="0">
+                <a:solidFill>
+                  <a:srgbClr val="000000"/>
+                </a:solidFill>
+                <a:latin typeface="Consolas" panose="020B0609020204030204" pitchFamily="49" charset="0"/>
+              </a:rPr>
+              <a:t> model){</a:t>
+            </a:r>
+          </a:p>
+          <a:p>
+            <a:r>
+              <a:rPr lang="en-US" dirty="0">
+                <a:solidFill>
+                  <a:srgbClr val="000000"/>
+                </a:solidFill>
+                <a:latin typeface="Consolas" panose="020B0609020204030204" pitchFamily="49" charset="0"/>
+              </a:rPr>
+              <a:t>    </a:t>
+            </a:r>
+            <a:r>
+              <a:rPr lang="en-US" dirty="0">
+                <a:solidFill>
+                  <a:srgbClr val="008000"/>
+                </a:solidFill>
+                <a:latin typeface="Consolas" panose="020B0609020204030204" pitchFamily="49" charset="0"/>
+              </a:rPr>
+              <a:t>// no </a:t>
+            </a:r>
+            <a:r>
+              <a:rPr lang="en-US" dirty="0" err="1">
+                <a:solidFill>
+                  <a:srgbClr val="008000"/>
+                </a:solidFill>
+                <a:latin typeface="Consolas" panose="020B0609020204030204" pitchFamily="49" charset="0"/>
+              </a:rPr>
+              <a:t>antiforgery</a:t>
+            </a:r>
+            <a:r>
+              <a:rPr lang="en-US" dirty="0">
+                <a:solidFill>
+                  <a:srgbClr val="008000"/>
+                </a:solidFill>
+                <a:latin typeface="Consolas" panose="020B0609020204030204" pitchFamily="49" charset="0"/>
+              </a:rPr>
+              <a:t> token required</a:t>
+            </a:r>
+            <a:endParaRPr lang="en-US" dirty="0">
+              <a:solidFill>
+                <a:srgbClr val="000000"/>
+              </a:solidFill>
+              <a:latin typeface="Consolas" panose="020B0609020204030204" pitchFamily="49" charset="0"/>
+            </a:endParaRPr>
+          </a:p>
+          <a:p>
+            <a:r>
+              <a:rPr lang="en-US" dirty="0">
+                <a:solidFill>
+                  <a:srgbClr val="000000"/>
+                </a:solidFill>
+                <a:latin typeface="Consolas" panose="020B0609020204030204" pitchFamily="49" charset="0"/>
+              </a:rPr>
+              <a:t>    }</a:t>
+            </a:r>
+          </a:p>
+          <a:p>
+            <a:r>
+              <a:rPr lang="en-US" dirty="0">
+                <a:solidFill>
+                  <a:srgbClr val="000000"/>
+                </a:solidFill>
+                <a:latin typeface="Consolas" panose="020B0609020204030204" pitchFamily="49" charset="0"/>
+              </a:rPr>
+              <a:t>}</a:t>
+            </a:r>
+            <a:endParaRPr lang="en-US" b="0" dirty="0">
+              <a:solidFill>
+                <a:srgbClr val="000000"/>
+              </a:solidFill>
+              <a:effectLst/>
+              <a:latin typeface="Consolas" panose="020B0609020204030204" pitchFamily="49" charset="0"/>
+            </a:endParaRPr>
+          </a:p>
+        </p:txBody>
+      </p:sp>
     </p:spTree>
     <p:extLst>
       <p:ext uri="{BB962C8B-B14F-4D97-AF65-F5344CB8AC3E}">
-        <p14:creationId xmlns:p14="http://schemas.microsoft.com/office/powerpoint/2010/main" val="3580761977"/>
+        <p14:creationId xmlns:p14="http://schemas.microsoft.com/office/powerpoint/2010/main" val="2484118491"/>
       </p:ext>
     </p:extLst>
   </p:cSld>
@@ -16285,6 +16437,164 @@
       </p:grpSpPr>
       <p:sp>
         <p:nvSpPr>
+          <p:cNvPr id="2" name="Title 1"/>
+          <p:cNvSpPr>
+            <a:spLocks noGrp="1"/>
+          </p:cNvSpPr>
+          <p:nvPr>
+            <p:ph type="title"/>
+          </p:nvPr>
+        </p:nvSpPr>
+        <p:spPr/>
+        <p:txBody>
+          <a:bodyPr/>
+          <a:lstStyle/>
+          <a:p>
+            <a:r>
+              <a:rPr lang="en-US" dirty="0"/>
+              <a:t>Cross-Site Request forgery</a:t>
+            </a:r>
+            <a:endParaRPr lang="ro-RO" dirty="0"/>
+          </a:p>
+        </p:txBody>
+      </p:sp>
+      <p:sp>
+        <p:nvSpPr>
+          <p:cNvPr id="3" name="Content Placeholder 2"/>
+          <p:cNvSpPr>
+            <a:spLocks noGrp="1"/>
+          </p:cNvSpPr>
+          <p:nvPr>
+            <p:ph idx="1"/>
+          </p:nvPr>
+        </p:nvSpPr>
+        <p:spPr/>
+        <p:txBody>
+          <a:bodyPr/>
+          <a:lstStyle/>
+          <a:p>
+            <a:pPr marL="342900" indent="-342900">
+              <a:buFont typeface="Wingdings" panose="05000000000000000000" pitchFamily="2" charset="2"/>
+              <a:buChar char="§"/>
+            </a:pPr>
+            <a:r>
+              <a:rPr lang="en-US" dirty="0"/>
+              <a:t>JavaScript, AJAX, and SPAs (including </a:t>
+            </a:r>
+            <a:r>
+              <a:rPr lang="en-US" b="1" dirty="0"/>
+              <a:t>Angular</a:t>
+            </a:r>
+            <a:r>
+              <a:rPr lang="en-US" dirty="0"/>
+              <a:t>): </a:t>
+            </a:r>
+            <a:r>
+              <a:rPr lang="en-US" dirty="0">
+                <a:hlinkClick r:id="rId3"/>
+              </a:rPr>
+              <a:t>link</a:t>
+            </a:r>
+            <a:endParaRPr lang="en-US" dirty="0"/>
+          </a:p>
+          <a:p>
+            <a:pPr marL="342900" indent="-342900">
+              <a:buFont typeface="Wingdings" panose="05000000000000000000" pitchFamily="2" charset="2"/>
+              <a:buChar char="§"/>
+            </a:pPr>
+            <a:endParaRPr lang="en-US" dirty="0"/>
+          </a:p>
+          <a:p>
+            <a:pPr marL="342900" indent="-342900">
+              <a:buFont typeface="Wingdings" panose="05000000000000000000" pitchFamily="2" charset="2"/>
+              <a:buChar char="§"/>
+            </a:pPr>
+            <a:r>
+              <a:rPr lang="en-US" dirty="0"/>
+              <a:t>Further reading: </a:t>
+            </a:r>
+            <a:r>
+              <a:rPr lang="en-US" dirty="0">
+                <a:hlinkClick r:id="rId4"/>
+              </a:rPr>
+              <a:t>https://docs.microsoft.com/en-us/aspnet/core/security/anti-request-forgery?view=aspnetcore-2.0</a:t>
+            </a:r>
+            <a:endParaRPr lang="en-US" dirty="0"/>
+          </a:p>
+        </p:txBody>
+      </p:sp>
+      <p:sp>
+        <p:nvSpPr>
+          <p:cNvPr id="5" name="Text Placeholder 4">
+            <a:extLst>
+              <a:ext uri="{FF2B5EF4-FFF2-40B4-BE49-F238E27FC236}">
+                <a16:creationId xmlns:a16="http://schemas.microsoft.com/office/drawing/2014/main" id="{52A29470-1D14-4DB4-B2EB-AC6AD725BE5C}"/>
+              </a:ext>
+            </a:extLst>
+          </p:cNvPr>
+          <p:cNvSpPr>
+            <a:spLocks noGrp="1"/>
+          </p:cNvSpPr>
+          <p:nvPr>
+            <p:ph type="body" sz="quarter" idx="10"/>
+          </p:nvPr>
+        </p:nvSpPr>
+        <p:spPr/>
+        <p:txBody>
+          <a:bodyPr/>
+          <a:lstStyle/>
+          <a:p>
+            <a:r>
+              <a:rPr lang="en-US" dirty="0"/>
+              <a:t>How does ASP.NET Core MVC address CSRF?</a:t>
+            </a:r>
+          </a:p>
+        </p:txBody>
+      </p:sp>
+    </p:spTree>
+    <p:extLst>
+      <p:ext uri="{BB962C8B-B14F-4D97-AF65-F5344CB8AC3E}">
+        <p14:creationId xmlns:p14="http://schemas.microsoft.com/office/powerpoint/2010/main" val="3580761977"/>
+      </p:ext>
+    </p:extLst>
+  </p:cSld>
+  <p:clrMapOvr>
+    <a:masterClrMapping/>
+  </p:clrMapOvr>
+  <mc:AlternateContent xmlns:mc="http://schemas.openxmlformats.org/markup-compatibility/2006" xmlns:p14="http://schemas.microsoft.com/office/powerpoint/2010/main">
+    <mc:Choice Requires="p14">
+      <p:transition spd="med" p14:dur="700">
+        <p:fade/>
+      </p:transition>
+    </mc:Choice>
+    <mc:Fallback xmlns="">
+      <p:transition spd="med">
+        <p:fade/>
+      </p:transition>
+    </mc:Fallback>
+  </mc:AlternateContent>
+</p:sld>
+</file>
+
+<file path=ppt/slides/slide24.xml><?xml version="1.0" encoding="utf-8"?>
+<p:sld xmlns:a="http://schemas.openxmlformats.org/drawingml/2006/main" xmlns:r="http://schemas.openxmlformats.org/officeDocument/2006/relationships" xmlns:p="http://schemas.openxmlformats.org/presentationml/2006/main">
+  <p:cSld>
+    <p:spTree>
+      <p:nvGrpSpPr>
+        <p:cNvPr id="1" name=""/>
+        <p:cNvGrpSpPr/>
+        <p:nvPr/>
+      </p:nvGrpSpPr>
+      <p:grpSpPr>
+        <a:xfrm>
+          <a:off x="0" y="0"/>
+          <a:ext cx="0" cy="0"/>
+          <a:chOff x="0" y="0"/>
+          <a:chExt cx="0" cy="0"/>
+        </a:xfrm>
+      </p:grpSpPr>
+      <p:sp>
+        <p:nvSpPr>
           <p:cNvPr id="5" name="Title 4">
             <a:extLst>
               <a:ext uri="{FF2B5EF4-FFF2-40B4-BE49-F238E27FC236}">
@@ -16336,7 +16646,7 @@
 </p:sld>
 </file>
 
-<file path=ppt/slides/slide24.xml><?xml version="1.0" encoding="utf-8"?>
+<file path=ppt/slides/slide25.xml><?xml version="1.0" encoding="utf-8"?>
 <p:sld xmlns:a="http://schemas.openxmlformats.org/drawingml/2006/main" xmlns:r="http://schemas.openxmlformats.org/officeDocument/2006/relationships" xmlns:p="http://schemas.openxmlformats.org/presentationml/2006/main">
   <p:cSld>
     <p:spTree>
@@ -16416,9 +16726,12 @@
               <a:rPr lang="en-US" dirty="0">
                 <a:hlinkClick r:id="rId2"/>
               </a:rPr>
-              <a:t>https://docs.microsoft.com/en-us/aspnet/core/security/cors?view=aspnetcore-2.0</a:t>
-            </a:r>
-            <a:endParaRPr lang="en-US" dirty="0"/>
+              <a:t>https://docs.microsoft.com/en-us/aspnet/core/security/cors?view=aspnetcore-2.1</a:t>
+            </a:r>
+            <a:r>
+              <a:rPr lang="en-US" dirty="0"/>
+              <a:t> </a:t>
+            </a:r>
           </a:p>
         </p:txBody>
       </p:sp>
@@ -16475,7 +16788,7 @@
 </p:sld>
 </file>
 
-<file path=ppt/slides/slide25.xml><?xml version="1.0" encoding="utf-8"?>
+<file path=ppt/slides/slide26.xml><?xml version="1.0" encoding="utf-8"?>
 <p:sld xmlns:a="http://schemas.openxmlformats.org/drawingml/2006/main" xmlns:r="http://schemas.openxmlformats.org/officeDocument/2006/relationships" xmlns:p="http://schemas.openxmlformats.org/presentationml/2006/main">
   <p:cSld>
     <p:spTree>
@@ -16546,7 +16859,7 @@
 </p:sld>
 </file>
 
-<file path=ppt/slides/slide26.xml><?xml version="1.0" encoding="utf-8"?>
+<file path=ppt/slides/slide27.xml><?xml version="1.0" encoding="utf-8"?>
 <p:sld xmlns:a="http://schemas.openxmlformats.org/drawingml/2006/main" xmlns:r="http://schemas.openxmlformats.org/officeDocument/2006/relationships" xmlns:p="http://schemas.openxmlformats.org/presentationml/2006/main">
   <p:cSld>
     <p:spTree>
@@ -16658,9 +16971,12 @@
               <a:rPr lang="en-US" dirty="0">
                 <a:hlinkClick r:id="rId2"/>
               </a:rPr>
-              <a:t>https://docs.microsoft.com/en-us/aspnet/core/security/cross-site-scripting?view=aspnetcore-2.0</a:t>
-            </a:r>
-            <a:endParaRPr lang="en-US" dirty="0"/>
+              <a:t>https://docs.microsoft.com/en-us/aspnet/core/security/cross-site-scripting?view=aspnetcore-2.1</a:t>
+            </a:r>
+            <a:r>
+              <a:rPr lang="en-US" dirty="0"/>
+              <a:t> </a:t>
+            </a:r>
           </a:p>
         </p:txBody>
       </p:sp>
@@ -16689,7 +17005,7 @@
 </p:sld>
 </file>
 
-<file path=ppt/slides/slide27.xml><?xml version="1.0" encoding="utf-8"?>
+<file path=ppt/slides/slide28.xml><?xml version="1.0" encoding="utf-8"?>
 <p:sld xmlns:a="http://schemas.openxmlformats.org/drawingml/2006/main" xmlns:r="http://schemas.openxmlformats.org/officeDocument/2006/relationships" xmlns:p="http://schemas.openxmlformats.org/presentationml/2006/main">
   <p:cSld>
     <p:spTree>
@@ -16759,7 +17075,7 @@
 </p:sld>
 </file>
 
-<file path=ppt/slides/slide28.xml><?xml version="1.0" encoding="utf-8"?>
+<file path=ppt/slides/slide29.xml><?xml version="1.0" encoding="utf-8"?>
 <p:sld xmlns:a="http://schemas.openxmlformats.org/drawingml/2006/main" xmlns:r="http://schemas.openxmlformats.org/officeDocument/2006/relationships" xmlns:p="http://schemas.openxmlformats.org/presentationml/2006/main">
   <p:cSld>
     <p:spTree>
@@ -16909,70 +17225,6 @@
     </mc:Choice>
     <mc:Fallback xmlns="">
       <p:transition spd="med">
-        <p:fade/>
-      </p:transition>
-    </mc:Fallback>
-  </mc:AlternateContent>
-</p:sld>
-</file>
-
-<file path=ppt/slides/slide29.xml><?xml version="1.0" encoding="utf-8"?>
-<p:sld xmlns:a="http://schemas.openxmlformats.org/drawingml/2006/main" xmlns:r="http://schemas.openxmlformats.org/officeDocument/2006/relationships" xmlns:p="http://schemas.openxmlformats.org/presentationml/2006/main">
-  <p:cSld>
-    <p:spTree>
-      <p:nvGrpSpPr>
-        <p:cNvPr id="1" name=""/>
-        <p:cNvGrpSpPr/>
-        <p:nvPr/>
-      </p:nvGrpSpPr>
-      <p:grpSpPr>
-        <a:xfrm>
-          <a:off x="0" y="0"/>
-          <a:ext cx="0" cy="0"/>
-          <a:chOff x="0" y="0"/>
-          <a:chExt cx="0" cy="0"/>
-        </a:xfrm>
-      </p:grpSpPr>
-      <p:sp>
-        <p:nvSpPr>
-          <p:cNvPr id="4" name="Title 3"/>
-          <p:cNvSpPr>
-            <a:spLocks noGrp="1"/>
-          </p:cNvSpPr>
-          <p:nvPr>
-            <p:ph type="title"/>
-          </p:nvPr>
-        </p:nvSpPr>
-        <p:spPr/>
-        <p:txBody>
-          <a:bodyPr/>
-          <a:lstStyle/>
-          <a:p>
-            <a:r>
-              <a:rPr lang="en-US" dirty="0"/>
-              <a:t>Thank you!</a:t>
-            </a:r>
-          </a:p>
-        </p:txBody>
-      </p:sp>
-    </p:spTree>
-    <p:extLst>
-      <p:ext uri="{BB962C8B-B14F-4D97-AF65-F5344CB8AC3E}">
-        <p14:creationId xmlns:p14="http://schemas.microsoft.com/office/powerpoint/2010/main" val="3366205155"/>
-      </p:ext>
-    </p:extLst>
-  </p:cSld>
-  <p:clrMapOvr>
-    <a:masterClrMapping/>
-  </p:clrMapOvr>
-  <mc:AlternateContent xmlns:mc="http://schemas.openxmlformats.org/markup-compatibility/2006" xmlns:p14="http://schemas.microsoft.com/office/powerpoint/2010/main">
-    <mc:Choice Requires="p14">
-      <p:transition spd="med" p14:dur="700" advClick="0" advTm="1500">
-        <p:fade/>
-      </p:transition>
-    </mc:Choice>
-    <mc:Fallback xmlns="">
-      <p:transition spd="med" advClick="0" advTm="1500">
         <p:fade/>
       </p:transition>
     </mc:Fallback>
@@ -17144,6 +17396,70 @@
 </file>
 
 <file path=ppt/slides/slide30.xml><?xml version="1.0" encoding="utf-8"?>
+<p:sld xmlns:a="http://schemas.openxmlformats.org/drawingml/2006/main" xmlns:r="http://schemas.openxmlformats.org/officeDocument/2006/relationships" xmlns:p="http://schemas.openxmlformats.org/presentationml/2006/main">
+  <p:cSld>
+    <p:spTree>
+      <p:nvGrpSpPr>
+        <p:cNvPr id="1" name=""/>
+        <p:cNvGrpSpPr/>
+        <p:nvPr/>
+      </p:nvGrpSpPr>
+      <p:grpSpPr>
+        <a:xfrm>
+          <a:off x="0" y="0"/>
+          <a:ext cx="0" cy="0"/>
+          <a:chOff x="0" y="0"/>
+          <a:chExt cx="0" cy="0"/>
+        </a:xfrm>
+      </p:grpSpPr>
+      <p:sp>
+        <p:nvSpPr>
+          <p:cNvPr id="4" name="Title 3"/>
+          <p:cNvSpPr>
+            <a:spLocks noGrp="1"/>
+          </p:cNvSpPr>
+          <p:nvPr>
+            <p:ph type="title"/>
+          </p:nvPr>
+        </p:nvSpPr>
+        <p:spPr/>
+        <p:txBody>
+          <a:bodyPr/>
+          <a:lstStyle/>
+          <a:p>
+            <a:r>
+              <a:rPr lang="en-US" dirty="0"/>
+              <a:t>Thank you!</a:t>
+            </a:r>
+          </a:p>
+        </p:txBody>
+      </p:sp>
+    </p:spTree>
+    <p:extLst>
+      <p:ext uri="{BB962C8B-B14F-4D97-AF65-F5344CB8AC3E}">
+        <p14:creationId xmlns:p14="http://schemas.microsoft.com/office/powerpoint/2010/main" val="3366205155"/>
+      </p:ext>
+    </p:extLst>
+  </p:cSld>
+  <p:clrMapOvr>
+    <a:masterClrMapping/>
+  </p:clrMapOvr>
+  <mc:AlternateContent xmlns:mc="http://schemas.openxmlformats.org/markup-compatibility/2006" xmlns:p14="http://schemas.microsoft.com/office/powerpoint/2010/main">
+    <mc:Choice Requires="p14">
+      <p:transition spd="med" p14:dur="700" advClick="0" advTm="1500">
+        <p:fade/>
+      </p:transition>
+    </mc:Choice>
+    <mc:Fallback xmlns="">
+      <p:transition spd="med" advClick="0" advTm="1500">
+        <p:fade/>
+      </p:transition>
+    </mc:Fallback>
+  </mc:AlternateContent>
+</p:sld>
+</file>
+
+<file path=ppt/slides/slide31.xml><?xml version="1.0" encoding="utf-8"?>
 <p:sld xmlns:a="http://schemas.openxmlformats.org/drawingml/2006/main" xmlns:r="http://schemas.openxmlformats.org/officeDocument/2006/relationships" xmlns:p="http://schemas.openxmlformats.org/presentationml/2006/main">
   <p:cSld>
     <p:spTree>
@@ -18274,7 +18590,7 @@
             </p:grpSpPr>
             <p:pic>
               <p:nvPicPr>
-                <p:cNvPr id="7" name="Picture 7">
+                <p:cNvPr id="2" name="Picture 2">
                   <a:hlinkClick r:id="rId6" action="ppaction://hlinksldjump"/>
                 </p:cNvPr>
                 <p:cNvPicPr>
@@ -18305,7 +18621,7 @@
             </p:pic>
             <p:pic>
               <p:nvPicPr>
-                <p:cNvPr id="8" name="Picture 8">
+                <p:cNvPr id="4" name="Picture 4">
                   <a:hlinkClick r:id="rId7" action="ppaction://hlinksldjump"/>
                 </p:cNvPr>
                 <p:cNvPicPr>
@@ -18336,7 +18652,7 @@
             </p:pic>
             <p:pic>
               <p:nvPicPr>
-                <p:cNvPr id="9" name="Picture 9">
+                <p:cNvPr id="6" name="Picture 6">
                   <a:hlinkClick r:id="rId8" action="ppaction://hlinksldjump"/>
                 </p:cNvPr>
                 <p:cNvPicPr>
@@ -18367,7 +18683,7 @@
             </p:pic>
             <p:pic>
               <p:nvPicPr>
-                <p:cNvPr id="10" name="Picture 10">
+                <p:cNvPr id="7" name="Picture 7">
                   <a:hlinkClick r:id="rId9" action="ppaction://hlinksldjump"/>
                 </p:cNvPr>
                 <p:cNvPicPr>
@@ -18487,9 +18803,12 @@
               <a:rPr lang="en-US" dirty="0">
                 <a:hlinkClick r:id="rId2"/>
               </a:rPr>
-              <a:t>https://docs.microsoft.com/en-us/aspnet/core/security/?view=aspnetcore-2.0</a:t>
-            </a:r>
-            <a:endParaRPr lang="en-US" dirty="0"/>
+              <a:t>https://docs.microsoft.com/en-us/aspnet/core/security/?view=aspnetcore-2.1</a:t>
+            </a:r>
+            <a:r>
+              <a:rPr lang="en-US" dirty="0"/>
+              <a:t> </a:t>
+            </a:r>
           </a:p>
           <a:p>
             <a:endParaRPr lang="en-US" dirty="0"/>

</xml_diff>